<commit_message>
updates format of slides
</commit_message>
<xml_diff>
--- a/survey/fig/howtosurvey.pptx
+++ b/survey/fig/howtosurvey.pptx
@@ -223,7 +223,7 @@
           </a:lstStyle>
           <a:p>
             <a:fld id="{6B8D1B20-A248-FB47-8240-73C0C5F47C9D}" type="datetimeFigureOut">
-              <a:t>2020/4/15</a:t>
+              <a:t>2023/2/15</a:t>
             </a:fld>
             <a:endParaRPr kumimoji="1" lang="ja-JP" altLang="en-US"/>
           </a:p>
@@ -692,7 +692,7 @@
               <a:pPr algn="ctr"/>
               <a:t>‹#›</a:t>
             </a:fld>
-            <a:endParaRPr kumimoji="1" lang="ja-JP" altLang="en-US" sz="1400"/>
+            <a:endParaRPr kumimoji="1" lang="ja-JP" altLang="en-US" sz="1400" dirty="0"/>
           </a:p>
         </p:txBody>
       </p:sp>
@@ -1164,7 +1164,7 @@
           <a:p>
             <a:pPr algn="ctr"/>
             <a:r>
-              <a:rPr lang="ja-JP" altLang="en-US" sz="3200" dirty="0" smtClean="0">
+              <a:rPr lang="ja-JP" altLang="en-US" sz="3200" dirty="0">
                 <a:solidFill>
                   <a:srgbClr val="011893"/>
                 </a:solidFill>
@@ -1208,10 +1208,10 @@
           <a:lstStyle/>
           <a:p>
             <a:r>
-              <a:rPr lang="ja-JP" altLang="en-US" sz="2400"/>
+              <a:rPr lang="ja-JP" altLang="en-US" sz="2400" dirty="0"/>
               <a:t>慶應義塾大学理工学部物理情報工学科</a:t>
             </a:r>
-            <a:endParaRPr lang="en-US" altLang="ja-JP" sz="2400"/>
+            <a:endParaRPr lang="en-US" altLang="ja-JP" sz="2400" dirty="0"/>
           </a:p>
         </p:txBody>
       </p:sp>
@@ -1280,16 +1280,16 @@
           <a:lstStyle/>
           <a:p>
             <a:r>
-              <a:rPr kumimoji="1" lang="en-US" altLang="ja-JP" sz="4000" dirty="0" smtClean="0"/>
-              <a:t>2020/0</a:t>
-            </a:r>
-            <a:r>
-              <a:rPr lang="en-US" altLang="ja-JP" sz="4000" dirty="0" smtClean="0"/>
-              <a:t>4</a:t>
-            </a:r>
-            <a:r>
-              <a:rPr kumimoji="1" lang="en-US" altLang="ja-JP" sz="4000" dirty="0" smtClean="0"/>
-              <a:t>/15</a:t>
+              <a:rPr kumimoji="1" lang="en-US" altLang="ja-JP" sz="4000" dirty="0"/>
+              <a:t>2023/0</a:t>
+            </a:r>
+            <a:r>
+              <a:rPr lang="en-US" altLang="ja-JP" sz="4000" dirty="0"/>
+              <a:t>2</a:t>
+            </a:r>
+            <a:r>
+              <a:rPr kumimoji="1" lang="en-US" altLang="ja-JP" sz="4000" dirty="0"/>
+              <a:t>/16</a:t>
             </a:r>
             <a:endParaRPr kumimoji="1" lang="ja-JP" altLang="en-US" sz="4000" dirty="0"/>
           </a:p>
@@ -1305,13 +1305,6 @@
   <p:clrMapOvr>
     <a:masterClrMapping/>
   </p:clrMapOvr>
-  <p:timing>
-    <p:tnLst>
-      <p:par>
-        <p:cTn id="1" dur="indefinite" restart="never" nodeType="tmRoot"/>
-      </p:par>
-    </p:tnLst>
-  </p:timing>
 </p:sld>
 </file>
 
@@ -1349,13 +1342,8 @@
           <a:p>
             <a:r>
               <a:rPr lang="ja-JP" altLang="en-US" dirty="0"/>
-              <a:t>イントロダクションの</a:t>
-            </a:r>
-            <a:r>
-              <a:rPr lang="ja-JP" altLang="en-US" dirty="0" smtClean="0"/>
-              <a:t>構造</a:t>
-            </a:r>
-            <a:endParaRPr lang="ja-JP" altLang="en-US" dirty="0"/>
+              <a:t>イントロダクションの構造</a:t>
+            </a:r>
           </a:p>
         </p:txBody>
       </p:sp>
@@ -1430,10 +1418,9 @@
           <a:lstStyle/>
           <a:p>
             <a:r>
-              <a:rPr kumimoji="1" lang="ja-JP" altLang="en-US" sz="2400" dirty="0" smtClean="0"/>
+              <a:rPr kumimoji="1" lang="ja-JP" altLang="en-US" sz="2400" dirty="0"/>
               <a:t>手法</a:t>
             </a:r>
-            <a:endParaRPr kumimoji="1" lang="ja-JP" altLang="en-US" sz="2400" dirty="0"/>
           </a:p>
         </p:txBody>
       </p:sp>
@@ -1745,11 +1732,11 @@
           <a:lstStyle/>
           <a:p>
             <a:r>
-              <a:rPr lang="ja-JP" altLang="en-US" sz="2000" dirty="0" smtClean="0"/>
+              <a:rPr lang="ja-JP" altLang="en-US" sz="2000" dirty="0"/>
               <a:t>導入</a:t>
             </a:r>
             <a:r>
-              <a:rPr lang="en-US" altLang="ja-JP" sz="2000" dirty="0" smtClean="0"/>
+              <a:rPr lang="en-US" altLang="ja-JP" sz="2000" dirty="0"/>
               <a:t>(introduction)</a:t>
             </a:r>
             <a:endParaRPr kumimoji="1" lang="ja-JP" altLang="en-US" sz="2000" dirty="0"/>
@@ -1830,18 +1817,17 @@
           <a:lstStyle/>
           <a:p>
             <a:r>
-              <a:rPr kumimoji="1" lang="ja-JP" altLang="en-US" dirty="0" smtClean="0"/>
+              <a:rPr kumimoji="1" lang="ja-JP" altLang="en-US" dirty="0"/>
               <a:t>なぜこの手法</a:t>
             </a:r>
             <a:r>
-              <a:rPr kumimoji="1" lang="en-US" altLang="ja-JP" dirty="0" smtClean="0"/>
+              <a:rPr kumimoji="1" lang="en-US" altLang="ja-JP" dirty="0"/>
               <a:t>/</a:t>
             </a:r>
             <a:r>
-              <a:rPr kumimoji="1" lang="ja-JP" altLang="en-US" dirty="0" smtClean="0"/>
+              <a:rPr kumimoji="1" lang="ja-JP" altLang="en-US" dirty="0"/>
               <a:t>分野が大事か</a:t>
             </a:r>
-            <a:endParaRPr kumimoji="1" lang="ja-JP" altLang="en-US" dirty="0"/>
           </a:p>
         </p:txBody>
       </p:sp>
@@ -1868,10 +1854,9 @@
           <a:lstStyle/>
           <a:p>
             <a:r>
-              <a:rPr kumimoji="1" lang="ja-JP" altLang="en-US" sz="2000" dirty="0" smtClean="0"/>
+              <a:rPr kumimoji="1" lang="ja-JP" altLang="en-US" sz="2000" dirty="0"/>
               <a:t>全体の背景</a:t>
             </a:r>
-            <a:endParaRPr kumimoji="1" lang="ja-JP" altLang="en-US" sz="2000" dirty="0"/>
           </a:p>
         </p:txBody>
       </p:sp>
@@ -1946,7 +1931,7 @@
           <a:lstStyle/>
           <a:p>
             <a:r>
-              <a:rPr lang="ja-JP" altLang="en-US" sz="2000" dirty="0" smtClean="0"/>
+              <a:rPr lang="ja-JP" altLang="en-US" sz="2000" dirty="0"/>
               <a:t>研究背景</a:t>
             </a:r>
             <a:endParaRPr kumimoji="1" lang="ja-JP" altLang="en-US" sz="2000" dirty="0"/>
@@ -1976,24 +1961,23 @@
           <a:lstStyle/>
           <a:p>
             <a:r>
-              <a:rPr kumimoji="1" lang="ja-JP" altLang="en-US" dirty="0" smtClean="0"/>
+              <a:rPr kumimoji="1" lang="ja-JP" altLang="en-US" dirty="0"/>
               <a:t>これまでにどのような研究が</a:t>
             </a:r>
-            <a:endParaRPr kumimoji="1" lang="en-US" altLang="ja-JP" dirty="0" smtClean="0"/>
-          </a:p>
-          <a:p>
-            <a:r>
-              <a:rPr lang="ja-JP" altLang="en-US" dirty="0" smtClean="0"/>
+            <a:endParaRPr kumimoji="1" lang="en-US" altLang="ja-JP" dirty="0"/>
+          </a:p>
+          <a:p>
+            <a:r>
+              <a:rPr lang="ja-JP" altLang="en-US" dirty="0"/>
               <a:t>行われ、何が解決され、何が</a:t>
             </a:r>
-            <a:endParaRPr lang="en-US" altLang="ja-JP" dirty="0" smtClean="0"/>
-          </a:p>
-          <a:p>
-            <a:r>
-              <a:rPr kumimoji="1" lang="ja-JP" altLang="en-US" dirty="0" smtClean="0"/>
+            <a:endParaRPr lang="en-US" altLang="ja-JP" dirty="0"/>
+          </a:p>
+          <a:p>
+            <a:r>
+              <a:rPr kumimoji="1" lang="ja-JP" altLang="en-US" dirty="0"/>
               <a:t>未解決問題として残っているか</a:t>
             </a:r>
-            <a:endParaRPr kumimoji="1" lang="ja-JP" altLang="en-US" dirty="0"/>
           </a:p>
         </p:txBody>
       </p:sp>
@@ -2105,10 +2089,9 @@
           <a:lstStyle/>
           <a:p>
             <a:r>
-              <a:rPr kumimoji="1" lang="ja-JP" altLang="en-US" sz="2000" dirty="0" smtClean="0"/>
+              <a:rPr kumimoji="1" lang="ja-JP" altLang="en-US" sz="2000" dirty="0"/>
               <a:t>研究概要</a:t>
             </a:r>
-            <a:endParaRPr kumimoji="1" lang="ja-JP" altLang="en-US" sz="2000" dirty="0"/>
           </a:p>
         </p:txBody>
       </p:sp>
@@ -2172,18 +2155,17 @@
           <a:lstStyle/>
           <a:p>
             <a:r>
-              <a:rPr kumimoji="1" lang="en-US" altLang="ja-JP" dirty="0" smtClean="0"/>
+              <a:rPr kumimoji="1" lang="en-US" altLang="ja-JP" dirty="0"/>
               <a:t>※</a:t>
             </a:r>
             <a:r>
-              <a:rPr lang="ja-JP" altLang="en-US" dirty="0" smtClean="0"/>
+              <a:rPr lang="ja-JP" altLang="en-US" dirty="0"/>
               <a:t>流儀</a:t>
             </a:r>
             <a:r>
-              <a:rPr kumimoji="1" lang="ja-JP" altLang="en-US" dirty="0" smtClean="0"/>
+              <a:rPr kumimoji="1" lang="ja-JP" altLang="en-US" dirty="0"/>
               <a:t>はいろいろあるので、あくまで一例です</a:t>
             </a:r>
-            <a:endParaRPr kumimoji="1" lang="ja-JP" altLang="en-US" dirty="0"/>
           </a:p>
         </p:txBody>
       </p:sp>
@@ -2210,26 +2192,22 @@
           <a:lstStyle/>
           <a:p>
             <a:r>
-              <a:rPr kumimoji="1" lang="ja-JP" altLang="en-US" dirty="0" smtClean="0"/>
+              <a:rPr kumimoji="1" lang="ja-JP" altLang="en-US" dirty="0"/>
               <a:t>以上の流れを受けて、この</a:t>
             </a:r>
-            <a:endParaRPr kumimoji="1" lang="en-US" altLang="ja-JP" dirty="0" smtClean="0"/>
-          </a:p>
-          <a:p>
-            <a:r>
-              <a:rPr lang="ja-JP" altLang="en-US" dirty="0" smtClean="0"/>
+            <a:endParaRPr kumimoji="1" lang="en-US" altLang="ja-JP" dirty="0"/>
+          </a:p>
+          <a:p>
+            <a:r>
+              <a:rPr lang="ja-JP" altLang="en-US" dirty="0"/>
               <a:t>研究では何を目的として何を</a:t>
             </a:r>
-            <a:endParaRPr lang="en-US" altLang="ja-JP" dirty="0" smtClean="0"/>
-          </a:p>
-          <a:p>
-            <a:r>
-              <a:rPr kumimoji="1" lang="ja-JP" altLang="en-US" dirty="0" smtClean="0"/>
-              <a:t>やる</a:t>
-            </a:r>
+            <a:endParaRPr lang="en-US" altLang="ja-JP" dirty="0"/>
+          </a:p>
+          <a:p>
             <a:r>
               <a:rPr kumimoji="1" lang="ja-JP" altLang="en-US" dirty="0"/>
-              <a:t>か</a:t>
+              <a:t>やるか</a:t>
             </a:r>
           </a:p>
         </p:txBody>
@@ -2281,13 +2259,8 @@
           <a:p>
             <a:r>
               <a:rPr lang="ja-JP" altLang="en-US" dirty="0"/>
-              <a:t>イントロダクションの</a:t>
-            </a:r>
-            <a:r>
-              <a:rPr lang="ja-JP" altLang="en-US" dirty="0" smtClean="0"/>
-              <a:t>構造</a:t>
-            </a:r>
-            <a:endParaRPr lang="ja-JP" altLang="en-US" dirty="0"/>
+              <a:t>イントロダクションの構造</a:t>
+            </a:r>
           </a:p>
         </p:txBody>
       </p:sp>
@@ -2342,18 +2315,17 @@
           <a:lstStyle/>
           <a:p>
             <a:r>
-              <a:rPr kumimoji="1" lang="ja-JP" altLang="en-US" sz="2800" dirty="0" smtClean="0"/>
+              <a:rPr kumimoji="1" lang="ja-JP" altLang="en-US" sz="2800" dirty="0"/>
               <a:t>実際の論文の</a:t>
             </a:r>
             <a:r>
-              <a:rPr kumimoji="1" lang="en-US" altLang="ja-JP" sz="2800" dirty="0" smtClean="0"/>
+              <a:rPr kumimoji="1" lang="en-US" altLang="ja-JP" sz="2800" dirty="0"/>
               <a:t>Introduction</a:t>
             </a:r>
             <a:r>
-              <a:rPr kumimoji="1" lang="ja-JP" altLang="en-US" sz="2800" dirty="0" smtClean="0"/>
+              <a:rPr kumimoji="1" lang="ja-JP" altLang="en-US" sz="2800" dirty="0"/>
               <a:t>を見てみる</a:t>
             </a:r>
-            <a:endParaRPr kumimoji="1" lang="ja-JP" altLang="en-US" sz="2800" dirty="0"/>
           </a:p>
         </p:txBody>
       </p:sp>
@@ -2450,10 +2422,9 @@
           <a:lstStyle/>
           <a:p>
             <a:r>
-              <a:rPr kumimoji="1" lang="ja-JP" altLang="en-US" sz="2800" dirty="0" smtClean="0"/>
+              <a:rPr kumimoji="1" lang="ja-JP" altLang="en-US" sz="2800" dirty="0"/>
               <a:t>全体の背景</a:t>
             </a:r>
-            <a:endParaRPr kumimoji="1" lang="ja-JP" altLang="en-US" sz="2800" dirty="0"/>
           </a:p>
         </p:txBody>
       </p:sp>
@@ -2572,10 +2543,9 @@
           <a:lstStyle/>
           <a:p>
             <a:r>
-              <a:rPr kumimoji="1" lang="ja-JP" altLang="en-US" sz="2800" dirty="0" smtClean="0"/>
+              <a:rPr kumimoji="1" lang="ja-JP" altLang="en-US" sz="2800" dirty="0"/>
               <a:t>研究背景</a:t>
             </a:r>
-            <a:endParaRPr kumimoji="1" lang="ja-JP" altLang="en-US" sz="2800" dirty="0"/>
           </a:p>
         </p:txBody>
       </p:sp>
@@ -2602,10 +2572,9 @@
           <a:lstStyle/>
           <a:p>
             <a:r>
-              <a:rPr kumimoji="1" lang="ja-JP" altLang="en-US" sz="2800" dirty="0" smtClean="0"/>
+              <a:rPr kumimoji="1" lang="ja-JP" altLang="en-US" sz="2800" dirty="0"/>
               <a:t>研究概要</a:t>
             </a:r>
-            <a:endParaRPr kumimoji="1" lang="ja-JP" altLang="en-US" sz="2800" dirty="0"/>
           </a:p>
         </p:txBody>
       </p:sp>
@@ -2634,13 +2603,7 @@
               <a:rPr lang="en-US" altLang="ja-JP" b="1" dirty="0">
                 <a:latin typeface="Corbel-Bold2"/>
               </a:rPr>
-              <a:t>Machine-Learning Studies on </a:t>
-            </a:r>
-            <a:r>
-              <a:rPr lang="en-US" altLang="ja-JP" b="1" dirty="0" smtClean="0">
-                <a:latin typeface="Corbel-Bold2"/>
-              </a:rPr>
-              <a:t>Spin</a:t>
+              <a:t>Machine-Learning Studies on Spin</a:t>
             </a:r>
             <a:r>
               <a:rPr lang="ja-JP" altLang="en-US" b="1" dirty="0">
@@ -2649,7 +2612,7 @@
               <a:t> </a:t>
             </a:r>
             <a:r>
-              <a:rPr lang="en-US" altLang="ja-JP" b="1" dirty="0" smtClean="0">
+              <a:rPr lang="en-US" altLang="ja-JP" b="1" dirty="0">
                 <a:latin typeface="Corbel-Bold2"/>
               </a:rPr>
               <a:t>Models</a:t>
@@ -2756,13 +2719,8 @@
           <a:p>
             <a:r>
               <a:rPr lang="ja-JP" altLang="en-US" dirty="0"/>
-              <a:t>イントロダクションの</a:t>
-            </a:r>
-            <a:r>
-              <a:rPr lang="ja-JP" altLang="en-US" dirty="0" smtClean="0"/>
-              <a:t>構造</a:t>
-            </a:r>
-            <a:endParaRPr lang="ja-JP" altLang="en-US" dirty="0"/>
+              <a:t>イントロダクションの構造</a:t>
+            </a:r>
           </a:p>
         </p:txBody>
       </p:sp>
@@ -2840,10 +2798,9 @@
           <a:lstStyle/>
           <a:p>
             <a:r>
-              <a:rPr kumimoji="1" lang="ja-JP" altLang="en-US" sz="2000" dirty="0" smtClean="0"/>
+              <a:rPr kumimoji="1" lang="ja-JP" altLang="en-US" sz="2000" dirty="0"/>
               <a:t>全体の背景</a:t>
             </a:r>
-            <a:endParaRPr kumimoji="1" lang="ja-JP" altLang="en-US" sz="2000" dirty="0"/>
           </a:p>
         </p:txBody>
       </p:sp>
@@ -2870,14 +2827,14 @@
           <a:lstStyle/>
           <a:p>
             <a:r>
-              <a:rPr lang="ja-JP" altLang="en-US" sz="2400" dirty="0" smtClean="0"/>
+              <a:rPr lang="ja-JP" altLang="en-US" sz="2400" dirty="0"/>
               <a:t>論文の冒頭で、</a:t>
             </a:r>
             <a:r>
-              <a:rPr kumimoji="1" lang="ja-JP" altLang="en-US" sz="2400" dirty="0" smtClean="0"/>
+              <a:rPr kumimoji="1" lang="ja-JP" altLang="en-US" sz="2400" dirty="0"/>
               <a:t>この手法や分野の重要性を説明する</a:t>
             </a:r>
-            <a:endParaRPr kumimoji="1" lang="en-US" altLang="ja-JP" sz="2400" dirty="0" smtClean="0"/>
+            <a:endParaRPr kumimoji="1" lang="en-US" altLang="ja-JP" sz="2400" dirty="0"/>
           </a:p>
         </p:txBody>
       </p:sp>
@@ -2904,15 +2861,7 @@
           <a:p>
             <a:r>
               <a:rPr lang="ja-JP" altLang="en-US" dirty="0"/>
-              <a:t>Numerical simulations, such as Monte Carlo methods, have been successfully employed in the study of </a:t>
-            </a:r>
-            <a:r>
-              <a:rPr lang="ja-JP" altLang="en-US" dirty="0" smtClean="0"/>
-              <a:t>phase transitions </a:t>
-            </a:r>
-            <a:r>
-              <a:rPr lang="ja-JP" altLang="en-US" dirty="0"/>
-              <a:t>and critical phenomena </a:t>
+              <a:t>Numerical simulations, such as Monte Carlo methods, have been successfully employed in the study of phase transitions and critical phenomena </a:t>
             </a:r>
             <a:r>
               <a:rPr lang="ja-JP" altLang="en-US" dirty="0">
@@ -2937,8 +2886,8 @@
         </p:nvSpPr>
         <p:spPr>
           <a:xfrm>
-            <a:off x="2339752" y="6237312"/>
-            <a:ext cx="6480720" cy="369332"/>
+            <a:off x="1403648" y="6237312"/>
+            <a:ext cx="7416824" cy="369332"/>
           </a:xfrm>
           <a:prstGeom prst="rect">
             <a:avLst/>
@@ -2952,7 +2901,15 @@
           <a:p>
             <a:r>
               <a:rPr lang="ja-JP" altLang="en-US" dirty="0"/>
-              <a:t>K. Shiina, H. Mori, Y. Okabe, and H.-K. Lee, Sci Rep 10, 2177 (2020)</a:t>
+              <a:t>K. Shiina, H. Mori, Y. Okabe, and H.-K. Lee, Sci Rep </a:t>
+            </a:r>
+            <a:r>
+              <a:rPr lang="ja-JP" altLang="en-US" b="1" dirty="0"/>
+              <a:t>10</a:t>
+            </a:r>
+            <a:r>
+              <a:rPr lang="ja-JP" altLang="en-US" dirty="0"/>
+              <a:t>, 2177 (2020)</a:t>
             </a:r>
           </a:p>
         </p:txBody>
@@ -2980,14 +2937,14 @@
           <a:lstStyle/>
           <a:p>
             <a:r>
-              <a:rPr kumimoji="1" lang="ja-JP" altLang="en-US" dirty="0" smtClean="0"/>
+              <a:rPr kumimoji="1" lang="ja-JP" altLang="en-US" dirty="0"/>
               <a:t>モンテカルロ法などの数値シミュレーションは、相転移や臨界現象の研究で</a:t>
             </a:r>
-            <a:endParaRPr kumimoji="1" lang="en-US" altLang="ja-JP" dirty="0" smtClean="0"/>
-          </a:p>
-          <a:p>
-            <a:r>
-              <a:rPr lang="ja-JP" altLang="en-US" dirty="0" smtClean="0"/>
+            <a:endParaRPr kumimoji="1" lang="en-US" altLang="ja-JP" dirty="0"/>
+          </a:p>
+          <a:p>
+            <a:r>
+              <a:rPr lang="ja-JP" altLang="en-US" dirty="0"/>
               <a:t>広く使われており、成功を収めている。</a:t>
             </a:r>
             <a:endParaRPr kumimoji="1" lang="ja-JP" altLang="en-US" dirty="0"/>
@@ -3017,14 +2974,13 @@
           <a:lstStyle/>
           <a:p>
             <a:r>
-              <a:rPr lang="ja-JP" altLang="en-US" dirty="0" smtClean="0"/>
+              <a:rPr lang="ja-JP" altLang="en-US" dirty="0"/>
               <a:t>冒頭で一番最初に単独で引用されるのは、その分野の有名な教科書や、レビュー論文で</a:t>
             </a:r>
             <a:r>
-              <a:rPr kumimoji="1" lang="ja-JP" altLang="en-US" dirty="0" smtClean="0"/>
+              <a:rPr kumimoji="1" lang="ja-JP" altLang="en-US" dirty="0"/>
               <a:t>あることが多い</a:t>
             </a:r>
-            <a:endParaRPr kumimoji="1" lang="ja-JP" altLang="en-US" dirty="0"/>
           </a:p>
         </p:txBody>
       </p:sp>
@@ -3159,13 +3115,8 @@
           <a:p>
             <a:r>
               <a:rPr lang="ja-JP" altLang="en-US" dirty="0"/>
-              <a:t>イントロダクションの</a:t>
-            </a:r>
-            <a:r>
-              <a:rPr lang="ja-JP" altLang="en-US" dirty="0" smtClean="0"/>
-              <a:t>構造</a:t>
-            </a:r>
-            <a:endParaRPr lang="ja-JP" altLang="en-US" dirty="0"/>
+              <a:t>イントロダクションの構造</a:t>
+            </a:r>
           </a:p>
         </p:txBody>
       </p:sp>
@@ -3240,10 +3191,9 @@
           <a:lstStyle/>
           <a:p>
             <a:r>
-              <a:rPr kumimoji="1" lang="ja-JP" altLang="en-US" sz="2000" dirty="0" smtClean="0"/>
+              <a:rPr kumimoji="1" lang="ja-JP" altLang="en-US" sz="2000" dirty="0"/>
               <a:t>研究背景</a:t>
             </a:r>
-            <a:endParaRPr kumimoji="1" lang="ja-JP" altLang="en-US" sz="2000" dirty="0"/>
           </a:p>
         </p:txBody>
       </p:sp>
@@ -3274,19 +3224,11 @@
               <a:buChar char="•"/>
             </a:pPr>
             <a:r>
-              <a:rPr kumimoji="1" lang="ja-JP" altLang="en-US" sz="2400" dirty="0" smtClean="0"/>
-              <a:t>どの</a:t>
-            </a:r>
-            <a:r>
-              <a:rPr kumimoji="1" lang="ja-JP" altLang="en-US" sz="2400" dirty="0" smtClean="0"/>
-              <a:t>ような研究</a:t>
-            </a:r>
-            <a:r>
-              <a:rPr kumimoji="1" lang="ja-JP" altLang="en-US" sz="2400" dirty="0" smtClean="0"/>
-              <a:t>が</a:t>
-            </a:r>
-            <a:r>
-              <a:rPr lang="ja-JP" altLang="en-US" sz="2400" dirty="0" smtClean="0"/>
+              <a:rPr kumimoji="1" lang="ja-JP" altLang="en-US" sz="2400" dirty="0"/>
+              <a:t>どのような研究が</a:t>
+            </a:r>
+            <a:r>
+              <a:rPr lang="ja-JP" altLang="en-US" sz="2400" dirty="0"/>
               <a:t>行われ</a:t>
             </a:r>
             <a:endParaRPr lang="en-US" altLang="ja-JP" sz="2400" dirty="0"/>
@@ -3297,18 +3239,10 @@
               <a:buChar char="•"/>
             </a:pPr>
             <a:r>
-              <a:rPr lang="ja-JP" altLang="en-US" sz="2400" dirty="0" smtClean="0"/>
-              <a:t>何</a:t>
-            </a:r>
-            <a:r>
-              <a:rPr lang="ja-JP" altLang="en-US" sz="2400" dirty="0" smtClean="0"/>
-              <a:t>が解決</a:t>
-            </a:r>
-            <a:r>
-              <a:rPr lang="ja-JP" altLang="en-US" sz="2400" dirty="0" smtClean="0"/>
-              <a:t>され</a:t>
-            </a:r>
-            <a:endParaRPr lang="en-US" altLang="ja-JP" sz="2400" dirty="0" smtClean="0"/>
+              <a:rPr lang="ja-JP" altLang="en-US" sz="2400" dirty="0"/>
+              <a:t>何が解決され</a:t>
+            </a:r>
+            <a:endParaRPr lang="en-US" altLang="ja-JP" sz="2400" dirty="0"/>
           </a:p>
           <a:p>
             <a:pPr marL="342900" indent="-342900">
@@ -3316,18 +3250,13 @@
               <a:buChar char="•"/>
             </a:pPr>
             <a:r>
-              <a:rPr lang="ja-JP" altLang="en-US" sz="2400" dirty="0" smtClean="0"/>
+              <a:rPr lang="ja-JP" altLang="en-US" sz="2400" dirty="0"/>
               <a:t>何が</a:t>
             </a:r>
             <a:r>
-              <a:rPr kumimoji="1" lang="ja-JP" altLang="en-US" sz="2400" dirty="0" smtClean="0"/>
-              <a:t>未解決</a:t>
-            </a:r>
-            <a:r>
-              <a:rPr kumimoji="1" lang="ja-JP" altLang="en-US" sz="2400" dirty="0" smtClean="0"/>
-              <a:t>問題として残っているか</a:t>
-            </a:r>
-            <a:endParaRPr kumimoji="1" lang="ja-JP" altLang="en-US" sz="2400" dirty="0"/>
+              <a:rPr kumimoji="1" lang="ja-JP" altLang="en-US" sz="2400" dirty="0"/>
+              <a:t>未解決問題として残っているか</a:t>
+            </a:r>
           </a:p>
         </p:txBody>
       </p:sp>
@@ -3382,63 +3311,51 @@
           <a:lstStyle/>
           <a:p>
             <a:r>
-              <a:rPr lang="ja-JP" altLang="en-US" sz="2400" dirty="0" smtClean="0"/>
-              <a:t>関連</a:t>
-            </a:r>
-            <a:r>
               <a:rPr lang="ja-JP" altLang="en-US" sz="2400" dirty="0"/>
-              <a:t>研究</a:t>
-            </a:r>
-            <a:r>
-              <a:rPr lang="ja-JP" altLang="en-US" sz="2400" dirty="0" smtClean="0"/>
-              <a:t>がまとめて紹介されることが多い</a:t>
-            </a:r>
-            <a:endParaRPr lang="en-US" altLang="ja-JP" sz="2400" dirty="0" smtClean="0"/>
-          </a:p>
-          <a:p>
-            <a:r>
-              <a:rPr kumimoji="1" lang="ja-JP" altLang="en-US" sz="2400" dirty="0" smtClean="0"/>
+              <a:t>関連研究がまとめて紹介されることが多い</a:t>
+            </a:r>
+            <a:endParaRPr lang="en-US" altLang="ja-JP" sz="2400" dirty="0"/>
+          </a:p>
+          <a:p>
+            <a:r>
+              <a:rPr kumimoji="1" lang="ja-JP" altLang="en-US" sz="2400" dirty="0"/>
               <a:t>「</a:t>
             </a:r>
             <a:r>
-              <a:rPr kumimoji="1" lang="en-US" altLang="ja-JP" sz="2400" dirty="0" smtClean="0"/>
+              <a:rPr kumimoji="1" lang="en-US" altLang="ja-JP" sz="2400" dirty="0"/>
               <a:t>recently</a:t>
             </a:r>
             <a:r>
-              <a:rPr kumimoji="1" lang="ja-JP" altLang="en-US" sz="2400" dirty="0" smtClean="0"/>
+              <a:rPr kumimoji="1" lang="ja-JP" altLang="en-US" sz="2400" dirty="0"/>
               <a:t>」というキーワードが使われることが多い</a:t>
             </a:r>
-            <a:endParaRPr kumimoji="1" lang="en-US" altLang="ja-JP" sz="2400" dirty="0" smtClean="0"/>
-          </a:p>
-          <a:p>
-            <a:r>
-              <a:rPr lang="ja-JP" altLang="en-US" sz="2400" dirty="0" smtClean="0"/>
-              <a:t>続けて</a:t>
-            </a:r>
+            <a:endParaRPr kumimoji="1" lang="en-US" altLang="ja-JP" sz="2400" dirty="0"/>
+          </a:p>
+          <a:p>
             <a:r>
               <a:rPr lang="ja-JP" altLang="en-US" sz="2400" dirty="0"/>
-              <a:t>、</a:t>
-            </a:r>
-            <a:r>
-              <a:rPr kumimoji="1" lang="ja-JP" altLang="en-US" sz="2400" dirty="0" smtClean="0"/>
+              <a:t>続けて、</a:t>
+            </a:r>
+            <a:r>
+              <a:rPr kumimoji="1" lang="ja-JP" altLang="en-US" sz="2400" dirty="0"/>
               <a:t>まとめて引用されたうちいくつかを紹介することも</a:t>
             </a:r>
-            <a:endParaRPr kumimoji="1" lang="en-US" altLang="ja-JP" sz="2400" dirty="0" smtClean="0"/>
-          </a:p>
-          <a:p>
-            <a:r>
-              <a:rPr lang="ja-JP" altLang="en-US" sz="2400" dirty="0" smtClean="0"/>
+            <a:endParaRPr kumimoji="1" lang="en-US" altLang="ja-JP" sz="2400" dirty="0"/>
+          </a:p>
+          <a:p>
+            <a:r>
+              <a:rPr lang="ja-JP" altLang="en-US" sz="2400" dirty="0"/>
               <a:t>ここに「</a:t>
             </a:r>
             <a:r>
-              <a:rPr lang="en-US" altLang="ja-JP" sz="2400" dirty="0" smtClean="0"/>
+              <a:rPr lang="en-US" altLang="ja-JP" sz="2400" dirty="0"/>
               <a:t>while</a:t>
             </a:r>
             <a:r>
-              <a:rPr lang="ja-JP" altLang="en-US" sz="2400" dirty="0" smtClean="0"/>
+              <a:rPr lang="ja-JP" altLang="en-US" sz="2400" dirty="0"/>
               <a:t>」があると、未解決部分の説明があることが多い</a:t>
             </a:r>
-            <a:endParaRPr lang="en-US" altLang="ja-JP" sz="2400" dirty="0" smtClean="0"/>
+            <a:endParaRPr lang="en-US" altLang="ja-JP" sz="2400" dirty="0"/>
           </a:p>
         </p:txBody>
       </p:sp>
@@ -3499,7 +3416,7 @@
         <p:spPr>
           <a:xfrm>
             <a:off x="467544" y="4077072"/>
-            <a:ext cx="7776864" cy="369332"/>
+            <a:ext cx="7704856" cy="338554"/>
           </a:xfrm>
           <a:prstGeom prst="rect">
             <a:avLst/>
@@ -3512,11 +3429,11 @@
           <a:lstStyle/>
           <a:p>
             <a:r>
-              <a:rPr lang="ja-JP" altLang="en-US" dirty="0"/>
+              <a:rPr lang="ja-JP" altLang="en-US" sz="1600" dirty="0"/>
               <a:t>Several spin models have </a:t>
             </a:r>
             <a:r>
-              <a:rPr lang="ja-JP" altLang="en-US" dirty="0">
+              <a:rPr lang="ja-JP" altLang="en-US" sz="1600" dirty="0">
                 <a:solidFill>
                   <a:srgbClr val="FF0000"/>
                 </a:solidFill>
@@ -3524,11 +3441,11 @@
               <a:t>recently</a:t>
             </a:r>
             <a:r>
-              <a:rPr lang="ja-JP" altLang="en-US" dirty="0"/>
+              <a:rPr lang="ja-JP" altLang="en-US" sz="1600" dirty="0"/>
               <a:t> been studied through machine learning </a:t>
             </a:r>
             <a:r>
-              <a:rPr lang="ja-JP" altLang="en-US" dirty="0">
+              <a:rPr lang="ja-JP" altLang="en-US" sz="1600" dirty="0">
                 <a:solidFill>
                   <a:srgbClr val="FF0000"/>
                 </a:solidFill>
@@ -3536,7 +3453,7 @@
               <a:t>[2-6]</a:t>
             </a:r>
             <a:r>
-              <a:rPr lang="ja-JP" altLang="en-US" dirty="0"/>
+              <a:rPr lang="ja-JP" altLang="en-US" sz="1600" dirty="0"/>
               <a:t>.</a:t>
             </a:r>
           </a:p>
@@ -3565,10 +3482,9 @@
           <a:lstStyle/>
           <a:p>
             <a:r>
-              <a:rPr kumimoji="1" lang="ja-JP" altLang="en-US" dirty="0" smtClean="0"/>
+              <a:rPr kumimoji="1" lang="ja-JP" altLang="en-US" dirty="0"/>
               <a:t>最近、いくつかのスピン系が機械学習により研究されている。</a:t>
             </a:r>
-            <a:endParaRPr kumimoji="1" lang="ja-JP" altLang="en-US" dirty="0"/>
           </a:p>
         </p:txBody>
       </p:sp>
@@ -3595,31 +3511,27 @@
           <a:lstStyle/>
           <a:p>
             <a:r>
-              <a:rPr kumimoji="1" lang="en-US" altLang="ja-JP" dirty="0" smtClean="0"/>
+              <a:rPr kumimoji="1" lang="en-US" altLang="ja-JP" dirty="0"/>
               <a:t>※</a:t>
             </a:r>
             <a:r>
-              <a:rPr lang="ja-JP" altLang="en-US" dirty="0" smtClean="0"/>
+              <a:rPr lang="ja-JP" altLang="en-US" dirty="0"/>
               <a:t>流儀</a:t>
             </a:r>
             <a:r>
-              <a:rPr kumimoji="1" lang="ja-JP" altLang="en-US" dirty="0" smtClean="0"/>
-              <a:t>はいろいろあるので、あく</a:t>
-            </a:r>
-            <a:r>
-              <a:rPr kumimoji="1" lang="ja-JP" altLang="en-US" dirty="0" smtClean="0"/>
-              <a:t>まで</a:t>
-            </a:r>
-            <a:r>
-              <a:rPr lang="en-US" altLang="ja-JP" dirty="0" smtClean="0"/>
+              <a:rPr kumimoji="1" lang="ja-JP" altLang="en-US" dirty="0"/>
+              <a:t>はいろいろあるので、あくまで</a:t>
+            </a:r>
+            <a:r>
+              <a:rPr lang="en-US" altLang="ja-JP" dirty="0"/>
               <a:t>(</a:t>
             </a:r>
             <a:r>
-              <a:rPr lang="ja-JP" altLang="en-US" dirty="0" smtClean="0"/>
+              <a:rPr lang="ja-JP" altLang="en-US" dirty="0"/>
               <a:t>略</a:t>
             </a:r>
             <a:r>
-              <a:rPr lang="en-US" altLang="ja-JP" dirty="0" smtClean="0"/>
+              <a:rPr lang="en-US" altLang="ja-JP" dirty="0"/>
               <a:t>)</a:t>
             </a:r>
             <a:endParaRPr kumimoji="1" lang="ja-JP" altLang="en-US" dirty="0"/>
@@ -3721,13 +3633,8 @@
           <a:p>
             <a:r>
               <a:rPr lang="ja-JP" altLang="en-US" dirty="0"/>
-              <a:t>イントロダクションの</a:t>
-            </a:r>
-            <a:r>
-              <a:rPr lang="ja-JP" altLang="en-US" dirty="0" smtClean="0"/>
-              <a:t>構造</a:t>
-            </a:r>
-            <a:endParaRPr lang="ja-JP" altLang="en-US" dirty="0"/>
+              <a:t>イントロダクションの構造</a:t>
+            </a:r>
           </a:p>
         </p:txBody>
       </p:sp>
@@ -3802,10 +3709,9 @@
           <a:lstStyle/>
           <a:p>
             <a:r>
-              <a:rPr kumimoji="1" lang="ja-JP" altLang="en-US" sz="2000" dirty="0" smtClean="0"/>
+              <a:rPr kumimoji="1" lang="ja-JP" altLang="en-US" sz="2000" dirty="0"/>
               <a:t>研究概要</a:t>
             </a:r>
-            <a:endParaRPr kumimoji="1" lang="ja-JP" altLang="en-US" sz="2000" dirty="0"/>
           </a:p>
         </p:txBody>
       </p:sp>
@@ -3832,18 +3738,18 @@
           <a:lstStyle/>
           <a:p>
             <a:r>
-              <a:rPr kumimoji="1" lang="ja-JP" altLang="en-US" sz="2400" dirty="0" smtClean="0"/>
+              <a:rPr kumimoji="1" lang="ja-JP" altLang="en-US" sz="2400" dirty="0"/>
               <a:t>この研究では</a:t>
             </a:r>
             <a:r>
-              <a:rPr lang="ja-JP" altLang="en-US" sz="2400" dirty="0" smtClean="0"/>
+              <a:rPr lang="ja-JP" altLang="en-US" sz="2400" dirty="0"/>
               <a:t>何を目的として</a:t>
             </a:r>
             <a:r>
-              <a:rPr kumimoji="1" lang="ja-JP" altLang="en-US" sz="2400" dirty="0" smtClean="0"/>
+              <a:rPr kumimoji="1" lang="ja-JP" altLang="en-US" sz="2400" dirty="0"/>
               <a:t>何をやるか</a:t>
             </a:r>
-            <a:endParaRPr kumimoji="1" lang="en-US" altLang="ja-JP" sz="2400" dirty="0" smtClean="0"/>
+            <a:endParaRPr kumimoji="1" lang="en-US" altLang="ja-JP" sz="2400" dirty="0"/>
           </a:p>
         </p:txBody>
       </p:sp>
@@ -3855,8 +3761,8 @@
         </p:nvSpPr>
         <p:spPr>
           <a:xfrm>
-            <a:off x="107504" y="3284984"/>
-            <a:ext cx="8910736" cy="646331"/>
+            <a:off x="225727" y="3284984"/>
+            <a:ext cx="8666753" cy="584775"/>
           </a:xfrm>
           <a:prstGeom prst="rect">
             <a:avLst/>
@@ -3869,29 +3775,13 @@
           <a:lstStyle/>
           <a:p>
             <a:r>
-              <a:rPr lang="ja-JP" altLang="en-US" dirty="0"/>
-              <a:t>本研究では、CarrasquillaとMelkoが提案した手法を拡張</a:t>
-            </a:r>
-            <a:r>
-              <a:rPr lang="ja-JP" altLang="en-US" dirty="0" smtClean="0"/>
-              <a:t>、一般</a:t>
-            </a:r>
-            <a:r>
-              <a:rPr lang="ja-JP" altLang="en-US" dirty="0"/>
-              <a:t>化</a:t>
-            </a:r>
-            <a:r>
-              <a:rPr lang="ja-JP" altLang="en-US" dirty="0" smtClean="0"/>
-              <a:t>する</a:t>
-            </a:r>
-            <a:r>
-              <a:rPr lang="ja-JP" altLang="en-US" dirty="0"/>
-              <a:t>。</a:t>
-            </a:r>
-          </a:p>
-          <a:p>
-            <a:r>
-              <a:rPr lang="ja-JP" altLang="en-US" dirty="0">
+              <a:rPr lang="ja-JP" altLang="en-US" sz="1600" dirty="0"/>
+              <a:t>本研究では、CarrasquillaとMelkoが提案した手法を拡張、一般化する。</a:t>
+            </a:r>
+          </a:p>
+          <a:p>
+            <a:r>
+              <a:rPr lang="ja-JP" altLang="en-US" sz="1600" dirty="0">
                 <a:solidFill>
                   <a:srgbClr val="FF0000"/>
                 </a:solidFill>
@@ -3899,7 +3789,7 @@
               <a:t>In this study, we</a:t>
             </a:r>
             <a:r>
-              <a:rPr lang="ja-JP" altLang="en-US" dirty="0"/>
+              <a:rPr lang="ja-JP" altLang="en-US" sz="1600" dirty="0"/>
               <a:t> extend and generalize the method proposed by Carrasquilla and Melko [2].</a:t>
             </a:r>
           </a:p>
@@ -3928,33 +3818,33 @@
           <a:lstStyle/>
           <a:p>
             <a:r>
-              <a:rPr lang="ja-JP" altLang="en-US" sz="2000" dirty="0" smtClean="0"/>
+              <a:rPr lang="ja-JP" altLang="en-US" sz="2000" dirty="0"/>
               <a:t>「</a:t>
             </a:r>
             <a:r>
-              <a:rPr lang="en-US" altLang="ja-JP" sz="2000" dirty="0" smtClean="0"/>
+              <a:rPr lang="en-US" altLang="ja-JP" sz="2000" dirty="0"/>
               <a:t>In this study</a:t>
             </a:r>
             <a:r>
-              <a:rPr lang="ja-JP" altLang="en-US" sz="2000" dirty="0" smtClean="0"/>
+              <a:rPr lang="ja-JP" altLang="en-US" sz="2000" dirty="0"/>
               <a:t>」や「</a:t>
             </a:r>
             <a:r>
-              <a:rPr lang="en-US" altLang="ja-JP" sz="2000" dirty="0" smtClean="0"/>
+              <a:rPr lang="en-US" altLang="ja-JP" sz="2000" dirty="0"/>
               <a:t>We</a:t>
             </a:r>
             <a:r>
-              <a:rPr lang="ja-JP" altLang="en-US" sz="2000" dirty="0" smtClean="0"/>
+              <a:rPr lang="ja-JP" altLang="en-US" sz="2000" dirty="0"/>
               <a:t>」というキーワードが使われることが多い</a:t>
             </a:r>
-            <a:endParaRPr lang="en-US" altLang="ja-JP" sz="2000" dirty="0" smtClean="0"/>
-          </a:p>
-          <a:p>
-            <a:r>
-              <a:rPr lang="ja-JP" altLang="en-US" sz="2000" dirty="0" smtClean="0"/>
+            <a:endParaRPr lang="en-US" altLang="ja-JP" sz="2000" dirty="0"/>
+          </a:p>
+          <a:p>
+            <a:r>
+              <a:rPr lang="ja-JP" altLang="en-US" sz="2000" dirty="0"/>
               <a:t>最後に論文の構造を説明することが多い</a:t>
             </a:r>
-            <a:endParaRPr lang="en-US" altLang="ja-JP" sz="2000" dirty="0" smtClean="0"/>
+            <a:endParaRPr lang="en-US" altLang="ja-JP" sz="2000" dirty="0"/>
           </a:p>
         </p:txBody>
       </p:sp>
@@ -3981,38 +3871,22 @@
           <a:lstStyle/>
           <a:p>
             <a:r>
-              <a:rPr lang="ja-JP" altLang="en-US" sz="2000" dirty="0" smtClean="0"/>
-              <a:t>ここで</a:t>
-            </a:r>
-            <a:r>
               <a:rPr lang="ja-JP" altLang="en-US" sz="2000" dirty="0"/>
-              <a:t>、</a:t>
-            </a:r>
-            <a:r>
-              <a:rPr lang="ja-JP" altLang="en-US" sz="2000" dirty="0" smtClean="0"/>
-              <a:t>「直接の親」が Carrasquilla </a:t>
+              <a:t>ここで、「直接の親」が Carrasquilla and Melko [2]であることがわかる</a:t>
+            </a:r>
+            <a:endParaRPr lang="en-US" altLang="ja-JP" sz="2000" dirty="0"/>
+          </a:p>
+          <a:p>
+            <a:r>
+              <a:rPr lang="en-US" altLang="ja-JP" sz="2000" dirty="0"/>
+              <a:t>(</a:t>
             </a:r>
             <a:r>
               <a:rPr lang="ja-JP" altLang="en-US" sz="2000" dirty="0"/>
-              <a:t>and Melko [2</a:t>
-            </a:r>
-            <a:r>
-              <a:rPr lang="ja-JP" altLang="en-US" sz="2000" dirty="0" smtClean="0"/>
-              <a:t>]であることがわかる</a:t>
-            </a:r>
-            <a:endParaRPr lang="en-US" altLang="ja-JP" sz="2000" dirty="0" smtClean="0"/>
-          </a:p>
-          <a:p>
-            <a:r>
-              <a:rPr lang="en-US" altLang="ja-JP" sz="2000" dirty="0" smtClean="0"/>
-              <a:t>(</a:t>
-            </a:r>
-            <a:r>
-              <a:rPr lang="ja-JP" altLang="en-US" sz="2000" dirty="0" smtClean="0"/>
               <a:t>一般的には「研究背景」に「親」の記述があることが多い</a:t>
             </a:r>
             <a:r>
-              <a:rPr lang="en-US" altLang="ja-JP" sz="2000" dirty="0" smtClean="0"/>
+              <a:rPr lang="en-US" altLang="ja-JP" sz="2000" dirty="0"/>
               <a:t>)</a:t>
             </a:r>
           </a:p>
@@ -4041,31 +3915,27 @@
           <a:lstStyle/>
           <a:p>
             <a:r>
-              <a:rPr kumimoji="1" lang="en-US" altLang="ja-JP" dirty="0" smtClean="0"/>
+              <a:rPr kumimoji="1" lang="en-US" altLang="ja-JP" dirty="0"/>
               <a:t>※</a:t>
             </a:r>
             <a:r>
-              <a:rPr lang="ja-JP" altLang="en-US" dirty="0" smtClean="0"/>
+              <a:rPr lang="ja-JP" altLang="en-US" dirty="0"/>
               <a:t>流儀</a:t>
             </a:r>
             <a:r>
-              <a:rPr kumimoji="1" lang="ja-JP" altLang="en-US" dirty="0" smtClean="0"/>
-              <a:t>は</a:t>
-            </a:r>
-            <a:r>
-              <a:rPr kumimoji="1" lang="ja-JP" altLang="en-US" dirty="0" smtClean="0"/>
-              <a:t>いろいろ </a:t>
-            </a:r>
-            <a:r>
-              <a:rPr lang="en-US" altLang="ja-JP" dirty="0" smtClean="0"/>
+              <a:rPr kumimoji="1" lang="ja-JP" altLang="en-US" dirty="0"/>
+              <a:t>はいろいろ </a:t>
+            </a:r>
+            <a:r>
+              <a:rPr lang="en-US" altLang="ja-JP" dirty="0"/>
               <a:t>(</a:t>
             </a:r>
             <a:r>
-              <a:rPr lang="ja-JP" altLang="en-US" dirty="0" smtClean="0"/>
+              <a:rPr lang="ja-JP" altLang="en-US" dirty="0"/>
               <a:t>略</a:t>
             </a:r>
             <a:r>
-              <a:rPr lang="en-US" altLang="ja-JP" dirty="0" smtClean="0"/>
+              <a:rPr lang="en-US" altLang="ja-JP" dirty="0"/>
               <a:t>)</a:t>
             </a:r>
             <a:endParaRPr kumimoji="1" lang="ja-JP" altLang="en-US" dirty="0"/>
@@ -4118,10 +3988,9 @@
           <a:lstStyle/>
           <a:p>
             <a:r>
-              <a:rPr kumimoji="1" lang="ja-JP" altLang="en-US" dirty="0" smtClean="0"/>
+              <a:rPr kumimoji="1" lang="ja-JP" altLang="en-US" dirty="0"/>
               <a:t>論文を渡されたら</a:t>
             </a:r>
-            <a:endParaRPr kumimoji="1" lang="ja-JP" altLang="en-US" dirty="0"/>
           </a:p>
         </p:txBody>
       </p:sp>
@@ -4151,7 +4020,7 @@
               <a:buAutoNum type="arabicPeriod"/>
             </a:pPr>
             <a:r>
-              <a:rPr kumimoji="1" lang="ja-JP" altLang="en-US" sz="3600" dirty="0" smtClean="0"/>
+              <a:rPr kumimoji="1" lang="ja-JP" altLang="en-US" sz="3600" dirty="0"/>
               <a:t>まずイントロダクションを読む</a:t>
             </a:r>
             <a:endParaRPr lang="en-US" altLang="ja-JP" sz="3600" dirty="0"/>
@@ -4161,7 +4030,7 @@
               <a:buAutoNum type="arabicPeriod"/>
             </a:pPr>
             <a:r>
-              <a:rPr kumimoji="1" lang="ja-JP" altLang="en-US" sz="3600" dirty="0" smtClean="0"/>
+              <a:rPr kumimoji="1" lang="ja-JP" altLang="en-US" sz="3600" dirty="0"/>
               <a:t>関連論文にあたりをつける</a:t>
             </a:r>
             <a:endParaRPr lang="en-US" altLang="ja-JP" sz="3600" dirty="0"/>
@@ -4171,33 +4040,33 @@
               <a:buAutoNum type="arabicPeriod"/>
             </a:pPr>
             <a:r>
-              <a:rPr kumimoji="1" lang="ja-JP" altLang="en-US" sz="3600" dirty="0" smtClean="0"/>
+              <a:rPr kumimoji="1" lang="ja-JP" altLang="en-US" sz="3600" dirty="0"/>
               <a:t>関連論文をダウンロードする</a:t>
             </a:r>
-            <a:endParaRPr kumimoji="1" lang="en-US" altLang="ja-JP" sz="3600" dirty="0" smtClean="0"/>
+            <a:endParaRPr kumimoji="1" lang="en-US" altLang="ja-JP" sz="3600" dirty="0"/>
           </a:p>
           <a:p>
             <a:pPr marL="742950" indent="-742950">
               <a:buAutoNum type="arabicPeriod"/>
             </a:pPr>
             <a:r>
-              <a:rPr lang="ja-JP" altLang="en-US" sz="3600" dirty="0" smtClean="0"/>
+              <a:rPr lang="ja-JP" altLang="en-US" sz="3600" dirty="0"/>
               <a:t>収束するまで</a:t>
             </a:r>
             <a:r>
-              <a:rPr lang="en-US" altLang="ja-JP" sz="3600" dirty="0" smtClean="0"/>
+              <a:rPr lang="en-US" altLang="ja-JP" sz="3600" dirty="0"/>
               <a:t>1</a:t>
             </a:r>
             <a:r>
-              <a:rPr lang="ja-JP" altLang="en-US" sz="3600" dirty="0" smtClean="0"/>
+              <a:rPr lang="ja-JP" altLang="en-US" sz="3600" dirty="0"/>
               <a:t>～</a:t>
             </a:r>
             <a:r>
-              <a:rPr lang="en-US" altLang="ja-JP" sz="3600" dirty="0" smtClean="0"/>
+              <a:rPr lang="en-US" altLang="ja-JP" sz="3600" dirty="0"/>
               <a:t>3</a:t>
             </a:r>
             <a:r>
-              <a:rPr lang="ja-JP" altLang="en-US" sz="3600" dirty="0" smtClean="0"/>
+              <a:rPr lang="ja-JP" altLang="en-US" sz="3600" dirty="0"/>
               <a:t>を繰り返す</a:t>
             </a:r>
             <a:endParaRPr kumimoji="1" lang="ja-JP" altLang="en-US" sz="3600" dirty="0"/>
@@ -4309,7 +4178,7 @@
           <a:lstStyle/>
           <a:p>
             <a:r>
-              <a:rPr lang="ja-JP" altLang="en-US" sz="3200" dirty="0" smtClean="0"/>
+              <a:rPr lang="ja-JP" altLang="en-US" sz="3200" dirty="0"/>
               <a:t>その論文を熟読して内容を理解する</a:t>
             </a:r>
             <a:endParaRPr kumimoji="1" lang="ja-JP" altLang="en-US" sz="3200" dirty="0"/>
@@ -4339,7 +4208,7 @@
           <a:lstStyle/>
           <a:p>
             <a:r>
-              <a:rPr lang="ja-JP" altLang="en-US" sz="3200" dirty="0" smtClean="0"/>
+              <a:rPr lang="ja-JP" altLang="en-US" sz="3200" dirty="0"/>
               <a:t>その論文の研究上の位置づけを調べる</a:t>
             </a:r>
             <a:endParaRPr kumimoji="1" lang="ja-JP" altLang="en-US" sz="3200" dirty="0"/>
@@ -4369,14 +4238,10 @@
           <a:lstStyle/>
           <a:p>
             <a:r>
-              <a:rPr lang="ja-JP" altLang="en-US" sz="2000" dirty="0" smtClean="0"/>
-              <a:t>収束：「あ、この論文読んだな」の出現確率が一定以上高くなるこ</a:t>
-            </a:r>
-            <a:r>
               <a:rPr lang="ja-JP" altLang="en-US" sz="2000" dirty="0"/>
-              <a:t>と</a:t>
-            </a:r>
-            <a:endParaRPr lang="en-US" altLang="ja-JP" sz="2000" dirty="0" smtClean="0"/>
+              <a:t>収束：「あ、この論文読んだな」の出現確率が一定以上高くなること</a:t>
+            </a:r>
+            <a:endParaRPr lang="en-US" altLang="ja-JP" sz="2000" dirty="0"/>
           </a:p>
         </p:txBody>
       </p:sp>
@@ -4426,10 +4291,9 @@
           <a:lstStyle/>
           <a:p>
             <a:r>
-              <a:rPr kumimoji="1" lang="ja-JP" altLang="en-US" dirty="0" smtClean="0"/>
+              <a:rPr kumimoji="1" lang="ja-JP" altLang="en-US" dirty="0"/>
               <a:t>その他雑多なこと</a:t>
             </a:r>
-            <a:endParaRPr kumimoji="1" lang="ja-JP" altLang="en-US" dirty="0"/>
           </a:p>
         </p:txBody>
       </p:sp>
@@ -4460,10 +4324,10 @@
               <a:buChar char="•"/>
             </a:pPr>
             <a:r>
-              <a:rPr kumimoji="1" lang="ja-JP" altLang="en-US" sz="2800" dirty="0" smtClean="0"/>
+              <a:rPr kumimoji="1" lang="ja-JP" altLang="en-US" sz="2800" dirty="0"/>
               <a:t>多くの論文から「冒頭」で引用されているレビュー論文は一度読んでみると良い</a:t>
             </a:r>
-            <a:endParaRPr kumimoji="1" lang="en-US" altLang="ja-JP" sz="2800" dirty="0" smtClean="0"/>
+            <a:endParaRPr kumimoji="1" lang="en-US" altLang="ja-JP" sz="2800" dirty="0"/>
           </a:p>
           <a:p>
             <a:pPr marL="457200" indent="-457200">
@@ -4471,62 +4335,58 @@
               <a:buChar char="•"/>
             </a:pPr>
             <a:r>
-              <a:rPr lang="en-US" altLang="ja-JP" sz="2800" dirty="0" smtClean="0"/>
+              <a:rPr lang="en-US" altLang="ja-JP" sz="2800" dirty="0"/>
               <a:t>DL</a:t>
             </a:r>
             <a:r>
-              <a:rPr lang="ja-JP" altLang="en-US" sz="2800" dirty="0" smtClean="0"/>
+              <a:rPr lang="ja-JP" altLang="en-US" sz="2800" dirty="0"/>
               <a:t>した論文は</a:t>
             </a:r>
             <a:r>
-              <a:rPr lang="en-US" altLang="ja-JP" sz="2800" dirty="0" smtClean="0"/>
+              <a:rPr lang="en-US" altLang="ja-JP" sz="2800" dirty="0"/>
               <a:t>(</a:t>
             </a:r>
             <a:r>
-              <a:rPr lang="ja-JP" altLang="en-US" sz="2800" dirty="0" smtClean="0"/>
+              <a:rPr lang="ja-JP" altLang="en-US" sz="2800" dirty="0"/>
               <a:t>読まなくても</a:t>
             </a:r>
             <a:r>
-              <a:rPr lang="en-US" altLang="ja-JP" sz="2800" dirty="0" smtClean="0"/>
+              <a:rPr lang="en-US" altLang="ja-JP" sz="2800" dirty="0"/>
               <a:t>)</a:t>
             </a:r>
             <a:r>
-              <a:rPr lang="ja-JP" altLang="en-US" sz="2800" dirty="0" smtClean="0"/>
+              <a:rPr lang="ja-JP" altLang="en-US" sz="2800" dirty="0"/>
               <a:t>保存しておく</a:t>
             </a:r>
-            <a:r>
-              <a:rPr lang="en-US" altLang="ja-JP" sz="2800" dirty="0" smtClean="0"/>
-              <a:t/>
-            </a:r>
             <a:br>
-              <a:rPr lang="en-US" altLang="ja-JP" sz="2800" dirty="0" smtClean="0"/>
+              <a:rPr lang="en-US" altLang="ja-JP" sz="2800" dirty="0"/>
             </a:br>
             <a:r>
-              <a:rPr lang="ja-JP" altLang="en-US" sz="2800" dirty="0" smtClean="0"/>
+              <a:rPr lang="ja-JP" altLang="en-US" sz="2800" dirty="0"/>
               <a:t>→文献管理ソフトウェア</a:t>
             </a:r>
             <a:r>
-              <a:rPr lang="en-US" altLang="ja-JP" sz="2800" dirty="0" smtClean="0"/>
+              <a:rPr lang="en-US" altLang="ja-JP" sz="2800" dirty="0"/>
               <a:t>(</a:t>
             </a:r>
             <a:r>
-              <a:rPr lang="ja-JP" altLang="en-US" sz="2800" dirty="0" smtClean="0"/>
+              <a:rPr lang="ja-JP" altLang="en-US" sz="2800" dirty="0"/>
               <a:t>例えば</a:t>
             </a:r>
             <a:r>
-              <a:rPr lang="en-US" altLang="ja-JP" sz="2800" dirty="0" err="1" smtClean="0"/>
+              <a:rPr lang="en-US" altLang="ja-JP" sz="2800" dirty="0" err="1"/>
               <a:t>Mendeley</a:t>
             </a:r>
             <a:r>
-              <a:rPr lang="ja-JP" altLang="en-US" sz="2800" dirty="0" smtClean="0"/>
+              <a:rPr lang="ja-JP" altLang="en-US" sz="2800" dirty="0"/>
               <a:t>等</a:t>
             </a:r>
             <a:r>
-              <a:rPr lang="en-US" altLang="ja-JP" sz="2800" dirty="0" smtClean="0"/>
+              <a:rPr lang="en-US" altLang="ja-JP" sz="2800" dirty="0"/>
               <a:t>)</a:t>
             </a:r>
             <a:r>
-              <a:rPr lang="ja-JP" altLang="en-US" sz="2800" dirty="0" smtClean="0"/>
+              <a:rPr lang="ja-JP" altLang="en-US" sz="2800" dirty="0"/>
               <a:t>を活用</a:t>
             </a:r>
             <a:endParaRPr kumimoji="1" lang="ja-JP" altLang="en-US" sz="2800" dirty="0"/>
@@ -4549,8 +4409,8 @@
         </p:blipFill>
         <p:spPr>
           <a:xfrm>
-            <a:off x="1619672" y="3789040"/>
-            <a:ext cx="6263085" cy="2916337"/>
+            <a:off x="1763688" y="3573016"/>
+            <a:ext cx="5472608" cy="2548260"/>
           </a:xfrm>
           <a:prstGeom prst="rect">
             <a:avLst/>
@@ -4565,7 +4425,7 @@
         </p:nvSpPr>
         <p:spPr>
           <a:xfrm>
-            <a:off x="323528" y="3284984"/>
+            <a:off x="395536" y="3068960"/>
             <a:ext cx="5069145" cy="461665"/>
           </a:xfrm>
           <a:prstGeom prst="rect">
@@ -4580,15 +4440,15 @@
           <a:lstStyle/>
           <a:p>
             <a:r>
-              <a:rPr lang="ja-JP" altLang="en-US" sz="2400" dirty="0" smtClean="0"/>
+              <a:rPr lang="ja-JP" altLang="en-US" sz="2400" dirty="0"/>
               <a:t>文献管理ソフトウェア「</a:t>
             </a:r>
             <a:r>
-              <a:rPr lang="en-US" altLang="ja-JP" sz="2400" dirty="0" err="1" smtClean="0"/>
+              <a:rPr lang="en-US" altLang="ja-JP" sz="2400" dirty="0" err="1"/>
               <a:t>Mendeley</a:t>
             </a:r>
             <a:r>
-              <a:rPr lang="ja-JP" altLang="en-US" sz="2400" dirty="0" smtClean="0"/>
+              <a:rPr lang="ja-JP" altLang="en-US" sz="2400" dirty="0"/>
               <a:t>」</a:t>
             </a:r>
             <a:endParaRPr kumimoji="1" lang="ja-JP" altLang="en-US" sz="2400" dirty="0"/>
@@ -4603,7 +4463,7 @@
         </p:nvSpPr>
         <p:spPr>
           <a:xfrm>
-            <a:off x="5220072" y="3356992"/>
+            <a:off x="5364088" y="3140968"/>
             <a:ext cx="2768194" cy="369332"/>
           </a:xfrm>
           <a:prstGeom prst="rect">
@@ -4623,6 +4483,45 @@
               <a:t>https://www.mendeley.com/</a:t>
             </a:r>
             <a:endParaRPr lang="ja-JP" altLang="en-US" dirty="0"/>
+          </a:p>
+        </p:txBody>
+      </p:sp>
+      <p:sp>
+        <p:nvSpPr>
+          <p:cNvPr id="4" name="テキスト ボックス 3">
+            <a:extLst>
+              <a:ext uri="{FF2B5EF4-FFF2-40B4-BE49-F238E27FC236}">
+                <a16:creationId xmlns:a16="http://schemas.microsoft.com/office/drawing/2014/main" id="{958E9047-0A70-7FC8-459F-D86481CA63B4}"/>
+              </a:ext>
+            </a:extLst>
+          </p:cNvPr>
+          <p:cNvSpPr txBox="1"/>
+          <p:nvPr/>
+        </p:nvSpPr>
+        <p:spPr>
+          <a:xfrm>
+            <a:off x="5508104" y="6381328"/>
+            <a:ext cx="3005951" cy="369332"/>
+          </a:xfrm>
+          <a:prstGeom prst="rect">
+            <a:avLst/>
+          </a:prstGeom>
+          <a:noFill/>
+        </p:spPr>
+        <p:txBody>
+          <a:bodyPr wrap="none" rtlCol="0">
+            <a:spAutoFit/>
+          </a:bodyPr>
+          <a:lstStyle/>
+          <a:p>
+            <a:r>
+              <a:rPr kumimoji="1" lang="en-US" altLang="ja-JP" dirty="0" err="1"/>
+              <a:t>Paperpile</a:t>
+            </a:r>
+            <a:r>
+              <a:rPr kumimoji="1" lang="ja-JP" altLang="en-US" dirty="0"/>
+              <a:t>なども良いらしい</a:t>
+            </a:r>
           </a:p>
         </p:txBody>
       </p:sp>
@@ -4672,10 +4571,9 @@
           <a:lstStyle/>
           <a:p>
             <a:r>
-              <a:rPr kumimoji="1" lang="ja-JP" altLang="en-US" dirty="0" smtClean="0"/>
+              <a:rPr kumimoji="1" lang="ja-JP" altLang="en-US" dirty="0"/>
               <a:t>まとめ</a:t>
             </a:r>
-            <a:endParaRPr kumimoji="1" lang="ja-JP" altLang="en-US" dirty="0"/>
           </a:p>
         </p:txBody>
       </p:sp>
@@ -4706,25 +4604,21 @@
               <a:buChar char="•"/>
             </a:pPr>
             <a:r>
-              <a:rPr kumimoji="1" lang="ja-JP" altLang="en-US" sz="3200" dirty="0" smtClean="0"/>
+              <a:rPr kumimoji="1" lang="ja-JP" altLang="en-US" sz="3200" dirty="0"/>
               <a:t>「この論文読んでみて」と言われたら</a:t>
             </a:r>
             <a:r>
               <a:rPr lang="ja-JP" altLang="en-US" sz="3200" dirty="0"/>
               <a:t>、</a:t>
-            </a:r>
-            <a:r>
-              <a:rPr lang="en-US" altLang="ja-JP" sz="3200" dirty="0"/>
-              <a:t/>
             </a:r>
             <a:br>
               <a:rPr lang="en-US" altLang="ja-JP" sz="3200" dirty="0"/>
             </a:br>
             <a:r>
-              <a:rPr kumimoji="1" lang="ja-JP" altLang="en-US" sz="3200" dirty="0" smtClean="0"/>
+              <a:rPr kumimoji="1" lang="ja-JP" altLang="en-US" sz="3200" dirty="0"/>
               <a:t>その論文の引用文献も読む</a:t>
             </a:r>
-            <a:endParaRPr kumimoji="1" lang="en-US" altLang="ja-JP" sz="3200" dirty="0" smtClean="0"/>
+            <a:endParaRPr kumimoji="1" lang="en-US" altLang="ja-JP" sz="3200" dirty="0"/>
           </a:p>
           <a:p>
             <a:pPr marL="457200" indent="-457200">
@@ -4741,21 +4635,9 @@
             </a:r>
             <a:r>
               <a:rPr lang="ja-JP" altLang="en-US" sz="3200" dirty="0"/>
-              <a:t>、イントロ</a:t>
-            </a:r>
-            <a:r>
-              <a:rPr lang="ja-JP" altLang="en-US" sz="3200" dirty="0" smtClean="0"/>
-              <a:t>であたり</a:t>
-            </a:r>
-            <a:r>
-              <a:rPr lang="ja-JP" altLang="en-US" sz="3200" dirty="0"/>
-              <a:t>を</a:t>
-            </a:r>
-            <a:r>
-              <a:rPr lang="ja-JP" altLang="en-US" sz="3200" dirty="0" smtClean="0"/>
-              <a:t>つける</a:t>
-            </a:r>
-            <a:endParaRPr lang="en-US" altLang="ja-JP" sz="3200" dirty="0" smtClean="0"/>
+              <a:t>、イントロであたりをつける</a:t>
+            </a:r>
+            <a:endParaRPr lang="en-US" altLang="ja-JP" sz="3200" dirty="0"/>
           </a:p>
           <a:p>
             <a:pPr marL="457200" indent="-457200">
@@ -4764,11 +4646,7 @@
             </a:pPr>
             <a:r>
               <a:rPr lang="ja-JP" altLang="en-US" sz="3200" dirty="0"/>
-              <a:t>必要に応じて、引用文献の引用文献も</a:t>
-            </a:r>
-            <a:r>
-              <a:rPr lang="ja-JP" altLang="en-US" sz="3200" dirty="0" smtClean="0"/>
-              <a:t>読む</a:t>
+              <a:t>必要に応じて、引用文献の引用文献も読む</a:t>
             </a:r>
             <a:endParaRPr lang="en-US" altLang="ja-JP" sz="3200" dirty="0"/>
           </a:p>
@@ -4797,30 +4675,22 @@
           <a:lstStyle/>
           <a:p>
             <a:r>
-              <a:rPr kumimoji="1" lang="ja-JP" altLang="en-US" sz="2400" dirty="0" smtClean="0"/>
+              <a:rPr kumimoji="1" lang="ja-JP" altLang="en-US" sz="2400" dirty="0"/>
               <a:t>論文の引用文献、引用文献の引用文献</a:t>
             </a:r>
             <a:r>
-              <a:rPr lang="en-US" altLang="ja-JP" sz="2400" dirty="0" smtClean="0"/>
+              <a:rPr lang="en-US" altLang="ja-JP" sz="2400" dirty="0"/>
               <a:t>……</a:t>
             </a:r>
             <a:r>
-              <a:rPr kumimoji="1" lang="ja-JP" altLang="en-US" sz="2400" dirty="0" smtClean="0"/>
+              <a:rPr kumimoji="1" lang="ja-JP" altLang="en-US" sz="2400" dirty="0"/>
               <a:t>際限なく「読むべき論文」が増えてい</a:t>
             </a:r>
             <a:r>
-              <a:rPr lang="ja-JP" altLang="en-US" sz="2400" dirty="0" smtClean="0"/>
-              <a:t>きます</a:t>
-            </a:r>
-            <a:r>
               <a:rPr lang="ja-JP" altLang="en-US" sz="2400" dirty="0"/>
-              <a:t>が</a:t>
-            </a:r>
-            <a:r>
-              <a:rPr lang="ja-JP" altLang="en-US" sz="2400" dirty="0" smtClean="0"/>
-              <a:t>、がんばりましょう</a:t>
-            </a:r>
-            <a:endParaRPr kumimoji="1" lang="en-US" altLang="ja-JP" sz="2400" dirty="0" smtClean="0"/>
+              <a:t>きますが、がんばりましょう</a:t>
+            </a:r>
+            <a:endParaRPr kumimoji="1" lang="en-US" altLang="ja-JP" sz="2400" dirty="0"/>
           </a:p>
         </p:txBody>
       </p:sp>
@@ -4911,7 +4781,7 @@
           <a:lstStyle/>
           <a:p>
             <a:r>
-              <a:rPr lang="ja-JP" altLang="en-US" dirty="0" smtClean="0"/>
+              <a:rPr lang="ja-JP" altLang="en-US" dirty="0"/>
               <a:t>初めての論文</a:t>
             </a:r>
             <a:endParaRPr kumimoji="1" lang="ja-JP" altLang="en-US" dirty="0"/>
@@ -4942,24 +4812,15 @@
           <a:p>
             <a:r>
               <a:rPr lang="ja-JP" altLang="en-US" sz="2800" dirty="0"/>
-              <a:t>指導</a:t>
-            </a:r>
-            <a:r>
-              <a:rPr lang="ja-JP" altLang="en-US" sz="2800" dirty="0" smtClean="0"/>
-              <a:t>教員に「この論文読んでみて」と言われた</a:t>
-            </a:r>
-            <a:endParaRPr lang="en-US" altLang="ja-JP" sz="2800" dirty="0" smtClean="0"/>
-          </a:p>
-          <a:p>
-            <a:r>
-              <a:rPr kumimoji="1" lang="ja-JP" altLang="en-US" sz="2800" dirty="0" smtClean="0"/>
-              <a:t>→まず</a:t>
-            </a:r>
-            <a:r>
-              <a:rPr kumimoji="1" lang="ja-JP" altLang="en-US" sz="2800" dirty="0" smtClean="0"/>
-              <a:t>やるべきことは？</a:t>
-            </a:r>
-            <a:endParaRPr kumimoji="1" lang="ja-JP" altLang="en-US" sz="2800" dirty="0"/>
+              <a:t>指導教員に「この論文読んでみて」と言われた</a:t>
+            </a:r>
+            <a:endParaRPr lang="en-US" altLang="ja-JP" sz="2800" dirty="0"/>
+          </a:p>
+          <a:p>
+            <a:r>
+              <a:rPr kumimoji="1" lang="ja-JP" altLang="en-US" sz="2800" dirty="0"/>
+              <a:t>→まずやるべきことは？</a:t>
+            </a:r>
           </a:p>
         </p:txBody>
       </p:sp>
@@ -5092,7 +4953,7 @@
           <a:lstStyle/>
           <a:p>
             <a:r>
-              <a:rPr lang="ja-JP" altLang="en-US" sz="3200" dirty="0" smtClean="0"/>
+              <a:rPr lang="ja-JP" altLang="en-US" sz="3200" dirty="0"/>
               <a:t>その論文を熟読して内容を理解する</a:t>
             </a:r>
             <a:endParaRPr kumimoji="1" lang="ja-JP" altLang="en-US" sz="3200" dirty="0"/>
@@ -5122,7 +4983,7 @@
           <a:lstStyle/>
           <a:p>
             <a:r>
-              <a:rPr lang="ja-JP" altLang="en-US" sz="3200" dirty="0" smtClean="0"/>
+              <a:rPr lang="ja-JP" altLang="en-US" sz="3200" dirty="0"/>
               <a:t>その論文の研究上の位置づけを調べる</a:t>
             </a:r>
             <a:endParaRPr kumimoji="1" lang="ja-JP" altLang="en-US" sz="3200" dirty="0"/>
@@ -5175,10 +5036,9 @@
           <a:lstStyle/>
           <a:p>
             <a:r>
-              <a:rPr kumimoji="1" lang="ja-JP" altLang="en-US" dirty="0" smtClean="0"/>
+              <a:rPr kumimoji="1" lang="ja-JP" altLang="en-US" dirty="0"/>
               <a:t>研究の流れ</a:t>
             </a:r>
-            <a:endParaRPr kumimoji="1" lang="ja-JP" altLang="en-US" dirty="0"/>
           </a:p>
         </p:txBody>
       </p:sp>
@@ -5205,10 +5065,9 @@
           <a:lstStyle/>
           <a:p>
             <a:r>
-              <a:rPr kumimoji="1" lang="ja-JP" altLang="en-US" sz="4000" dirty="0" smtClean="0"/>
+              <a:rPr kumimoji="1" lang="ja-JP" altLang="en-US" sz="4000" dirty="0"/>
               <a:t>把握すべきこと</a:t>
             </a:r>
-            <a:endParaRPr kumimoji="1" lang="ja-JP" altLang="en-US" sz="4000" dirty="0"/>
           </a:p>
         </p:txBody>
       </p:sp>
@@ -5239,26 +5098,26 @@
               <a:buChar char="•"/>
             </a:pPr>
             <a:r>
-              <a:rPr kumimoji="1" lang="ja-JP" altLang="en-US" sz="3200" dirty="0" smtClean="0"/>
+              <a:rPr kumimoji="1" lang="ja-JP" altLang="en-US" sz="3200" dirty="0"/>
               <a:t>起点となる研究</a:t>
             </a:r>
             <a:r>
-              <a:rPr kumimoji="1" lang="en-US" altLang="ja-JP" sz="3200" dirty="0" smtClean="0"/>
+              <a:rPr kumimoji="1" lang="en-US" altLang="ja-JP" sz="3200" dirty="0"/>
               <a:t>(</a:t>
             </a:r>
             <a:r>
-              <a:rPr kumimoji="1" lang="ja-JP" altLang="en-US" sz="3200" dirty="0" smtClean="0"/>
+              <a:rPr kumimoji="1" lang="ja-JP" altLang="en-US" sz="3200" dirty="0"/>
               <a:t>祖先</a:t>
             </a:r>
             <a:r>
-              <a:rPr kumimoji="1" lang="en-US" altLang="ja-JP" sz="3200" dirty="0" smtClean="0"/>
+              <a:rPr kumimoji="1" lang="en-US" altLang="ja-JP" sz="3200" dirty="0"/>
               <a:t>)</a:t>
             </a:r>
             <a:r>
-              <a:rPr kumimoji="1" lang="ja-JP" altLang="en-US" sz="3200" dirty="0" smtClean="0"/>
+              <a:rPr kumimoji="1" lang="ja-JP" altLang="en-US" sz="3200" dirty="0"/>
               <a:t>はどれか</a:t>
             </a:r>
-            <a:endParaRPr kumimoji="1" lang="en-US" altLang="ja-JP" sz="3200" dirty="0" smtClean="0"/>
+            <a:endParaRPr kumimoji="1" lang="en-US" altLang="ja-JP" sz="3200" dirty="0"/>
           </a:p>
           <a:p>
             <a:pPr marL="342900" indent="-342900">
@@ -5266,7 +5125,7 @@
               <a:buChar char="•"/>
             </a:pPr>
             <a:r>
-              <a:rPr kumimoji="1" lang="ja-JP" altLang="en-US" sz="3200" dirty="0" smtClean="0"/>
+              <a:rPr kumimoji="1" lang="ja-JP" altLang="en-US" sz="3200" dirty="0"/>
               <a:t>他にはどのようなアプローチが</a:t>
             </a:r>
             <a:r>
@@ -5274,10 +5133,10 @@
               <a:t>あ</a:t>
             </a:r>
             <a:r>
-              <a:rPr kumimoji="1" lang="ja-JP" altLang="en-US" sz="3200" dirty="0" smtClean="0"/>
+              <a:rPr kumimoji="1" lang="ja-JP" altLang="en-US" sz="3200" dirty="0"/>
               <a:t>るか</a:t>
             </a:r>
-            <a:endParaRPr kumimoji="1" lang="en-US" altLang="ja-JP" sz="3200" dirty="0" smtClean="0"/>
+            <a:endParaRPr kumimoji="1" lang="en-US" altLang="ja-JP" sz="3200" dirty="0"/>
           </a:p>
           <a:p>
             <a:pPr marL="342900" indent="-342900">
@@ -5285,10 +5144,9 @@
               <a:buChar char="•"/>
             </a:pPr>
             <a:r>
-              <a:rPr kumimoji="1" lang="ja-JP" altLang="en-US" sz="3200" dirty="0" smtClean="0"/>
+              <a:rPr kumimoji="1" lang="ja-JP" altLang="en-US" sz="3200" dirty="0"/>
               <a:t>直接の「親」となる論文はどれか</a:t>
             </a:r>
-            <a:endParaRPr kumimoji="1" lang="ja-JP" altLang="en-US" sz="3200" dirty="0"/>
           </a:p>
         </p:txBody>
       </p:sp>
@@ -5315,18 +5173,13 @@
           <a:lstStyle/>
           <a:p>
             <a:r>
-              <a:rPr kumimoji="1" lang="ja-JP" altLang="en-US" dirty="0" smtClean="0">
+              <a:rPr kumimoji="1" lang="ja-JP" altLang="en-US" dirty="0">
                 <a:solidFill>
                   <a:srgbClr val="FF0000"/>
                 </a:solidFill>
               </a:rPr>
               <a:t>特に「他にどのようなアプローチがあるか」は必ず聞かれるので把握しておく</a:t>
             </a:r>
-            <a:endParaRPr kumimoji="1" lang="ja-JP" altLang="en-US" dirty="0">
-              <a:solidFill>
-                <a:srgbClr val="FF0000"/>
-              </a:solidFill>
-            </a:endParaRPr>
           </a:p>
         </p:txBody>
       </p:sp>
@@ -5376,10 +5229,9 @@
           <a:lstStyle/>
           <a:p>
             <a:r>
-              <a:rPr kumimoji="1" lang="ja-JP" altLang="en-US" dirty="0" smtClean="0"/>
+              <a:rPr kumimoji="1" lang="ja-JP" altLang="en-US" dirty="0"/>
               <a:t>研究の流れ</a:t>
             </a:r>
-            <a:endParaRPr kumimoji="1" lang="ja-JP" altLang="en-US" dirty="0"/>
           </a:p>
         </p:txBody>
       </p:sp>
@@ -5406,10 +5258,9 @@
           <a:lstStyle/>
           <a:p>
             <a:r>
-              <a:rPr kumimoji="1" lang="ja-JP" altLang="en-US" sz="4000" dirty="0" smtClean="0"/>
+              <a:rPr kumimoji="1" lang="ja-JP" altLang="en-US" sz="4000" dirty="0"/>
               <a:t>研究には「流れ」がある</a:t>
             </a:r>
-            <a:endParaRPr kumimoji="1" lang="ja-JP" altLang="en-US" sz="4000" dirty="0"/>
           </a:p>
         </p:txBody>
       </p:sp>
@@ -5521,10 +5372,9 @@
           <a:lstStyle/>
           <a:p>
             <a:r>
-              <a:rPr kumimoji="1" lang="ja-JP" altLang="en-US" dirty="0" smtClean="0"/>
+              <a:rPr kumimoji="1" lang="ja-JP" altLang="en-US" dirty="0"/>
               <a:t>時間</a:t>
             </a:r>
-            <a:endParaRPr kumimoji="1" lang="ja-JP" altLang="en-US" dirty="0"/>
           </a:p>
         </p:txBody>
       </p:sp>
@@ -5551,7 +5401,7 @@
           <a:lstStyle/>
           <a:p>
             <a:r>
-              <a:rPr lang="ja-JP" altLang="en-US" dirty="0" smtClean="0"/>
+              <a:rPr lang="ja-JP" altLang="en-US" dirty="0"/>
               <a:t>画期的な論文</a:t>
             </a:r>
             <a:endParaRPr kumimoji="1" lang="ja-JP" altLang="en-US" dirty="0"/>
@@ -6461,10 +6311,9 @@
           <a:lstStyle/>
           <a:p>
             <a:r>
-              <a:rPr kumimoji="1" lang="ja-JP" altLang="en-US" dirty="0" smtClean="0"/>
+              <a:rPr kumimoji="1" lang="ja-JP" altLang="en-US" dirty="0"/>
               <a:t>大量のフォロワーが現れる</a:t>
             </a:r>
-            <a:endParaRPr kumimoji="1" lang="ja-JP" altLang="en-US" dirty="0"/>
           </a:p>
         </p:txBody>
       </p:sp>
@@ -6755,12 +6604,8 @@
           <a:lstStyle/>
           <a:p>
             <a:r>
-              <a:rPr lang="ja-JP" altLang="en-US" dirty="0" smtClean="0"/>
-              <a:t>停滞</a:t>
-            </a:r>
-            <a:r>
               <a:rPr lang="ja-JP" altLang="en-US" dirty="0"/>
-              <a:t>期</a:t>
+              <a:t>停滞期</a:t>
             </a:r>
             <a:endParaRPr kumimoji="1" lang="ja-JP" altLang="en-US" dirty="0"/>
           </a:p>
@@ -6927,7 +6772,7 @@
           <a:lstStyle/>
           <a:p>
             <a:r>
-              <a:rPr lang="ja-JP" altLang="en-US" dirty="0" smtClean="0"/>
+              <a:rPr lang="ja-JP" altLang="en-US" dirty="0"/>
               <a:t>画期的な論文</a:t>
             </a:r>
             <a:endParaRPr kumimoji="1" lang="ja-JP" altLang="en-US" dirty="0"/>
@@ -7879,10 +7724,9 @@
           <a:lstStyle/>
           <a:p>
             <a:r>
-              <a:rPr kumimoji="1" lang="ja-JP" altLang="en-US" dirty="0" smtClean="0"/>
+              <a:rPr kumimoji="1" lang="ja-JP" altLang="en-US" dirty="0"/>
               <a:t>大量のフォロワーが現れる</a:t>
             </a:r>
-            <a:endParaRPr kumimoji="1" lang="ja-JP" altLang="en-US" dirty="0"/>
           </a:p>
         </p:txBody>
       </p:sp>
@@ -7955,11 +7799,7 @@
           <a:p>
             <a:r>
               <a:rPr lang="ja-JP" altLang="en-US" dirty="0"/>
-              <a:t>読め</a:t>
-            </a:r>
-            <a:r>
-              <a:rPr lang="ja-JP" altLang="en-US" dirty="0" smtClean="0"/>
-              <a:t>と言われた論文</a:t>
+              <a:t>読めと言われた論文</a:t>
             </a:r>
             <a:endParaRPr kumimoji="1" lang="ja-JP" altLang="en-US" dirty="0"/>
           </a:p>
@@ -8048,10 +7888,9 @@
           <a:lstStyle/>
           <a:p>
             <a:r>
-              <a:rPr kumimoji="1" lang="ja-JP" altLang="en-US" dirty="0" smtClean="0"/>
+              <a:rPr kumimoji="1" lang="ja-JP" altLang="en-US" dirty="0"/>
               <a:t>研究の流れ</a:t>
             </a:r>
-            <a:endParaRPr kumimoji="1" lang="ja-JP" altLang="en-US" dirty="0"/>
           </a:p>
         </p:txBody>
       </p:sp>
@@ -8126,16 +7965,8 @@
           <a:lstStyle/>
           <a:p>
             <a:r>
-              <a:rPr lang="ja-JP" altLang="en-US" sz="2000" dirty="0" smtClean="0"/>
-              <a:t>問題</a:t>
-            </a:r>
-            <a:r>
               <a:rPr lang="ja-JP" altLang="en-US" sz="2000" dirty="0"/>
-              <a:t>提起</a:t>
-            </a:r>
-            <a:r>
-              <a:rPr lang="ja-JP" altLang="en-US" sz="2000" dirty="0" smtClean="0"/>
-              <a:t>となる研究</a:t>
+              <a:t>問題提起となる研究</a:t>
             </a:r>
             <a:endParaRPr kumimoji="1" lang="ja-JP" altLang="en-US" sz="2000" dirty="0"/>
           </a:p>
@@ -9107,11 +8938,11 @@
           <a:lstStyle/>
           <a:p>
             <a:r>
-              <a:rPr lang="ja-JP" altLang="en-US" sz="2400" dirty="0" smtClean="0"/>
+              <a:rPr lang="ja-JP" altLang="en-US" sz="2400" dirty="0"/>
               <a:t>この問題を</a:t>
             </a:r>
             <a:r>
-              <a:rPr lang="en-US" altLang="ja-JP" sz="2400" dirty="0" smtClean="0"/>
+              <a:rPr lang="en-US" altLang="ja-JP" sz="2400" dirty="0"/>
               <a:t>……</a:t>
             </a:r>
             <a:endParaRPr kumimoji="1" lang="ja-JP" altLang="en-US" sz="2400" dirty="0"/>
@@ -9141,21 +8972,20 @@
           <a:lstStyle/>
           <a:p>
             <a:r>
-              <a:rPr kumimoji="1" lang="en-US" altLang="ja-JP" sz="2400" dirty="0" smtClean="0"/>
+              <a:rPr kumimoji="1" lang="en-US" altLang="ja-JP" sz="2400" dirty="0"/>
               <a:t>A</a:t>
             </a:r>
             <a:r>
-              <a:rPr kumimoji="1" lang="ja-JP" altLang="en-US" sz="2400" dirty="0" smtClean="0"/>
+              <a:rPr kumimoji="1" lang="ja-JP" altLang="en-US" sz="2400" dirty="0"/>
               <a:t>という方法で</a:t>
             </a:r>
-            <a:endParaRPr kumimoji="1" lang="en-US" altLang="ja-JP" sz="2400" dirty="0" smtClean="0"/>
-          </a:p>
-          <a:p>
-            <a:r>
-              <a:rPr kumimoji="1" lang="ja-JP" altLang="en-US" sz="2400" dirty="0" smtClean="0"/>
+            <a:endParaRPr kumimoji="1" lang="en-US" altLang="ja-JP" sz="2400" dirty="0"/>
+          </a:p>
+          <a:p>
+            <a:r>
+              <a:rPr kumimoji="1" lang="ja-JP" altLang="en-US" sz="2400" dirty="0"/>
               <a:t>解決を試みる</a:t>
             </a:r>
-            <a:endParaRPr kumimoji="1" lang="ja-JP" altLang="en-US" sz="2400" dirty="0"/>
           </a:p>
         </p:txBody>
       </p:sp>
@@ -9228,21 +9058,20 @@
           <a:lstStyle/>
           <a:p>
             <a:r>
-              <a:rPr kumimoji="1" lang="en-US" altLang="ja-JP" sz="2400" dirty="0" smtClean="0"/>
+              <a:rPr kumimoji="1" lang="en-US" altLang="ja-JP" sz="2400" dirty="0"/>
               <a:t>B</a:t>
             </a:r>
             <a:r>
-              <a:rPr kumimoji="1" lang="ja-JP" altLang="en-US" sz="2400" dirty="0" smtClean="0"/>
+              <a:rPr kumimoji="1" lang="ja-JP" altLang="en-US" sz="2400" dirty="0"/>
               <a:t>という方法で</a:t>
             </a:r>
-            <a:endParaRPr kumimoji="1" lang="en-US" altLang="ja-JP" sz="2400" dirty="0" smtClean="0"/>
-          </a:p>
-          <a:p>
-            <a:r>
-              <a:rPr kumimoji="1" lang="ja-JP" altLang="en-US" sz="2400" dirty="0" smtClean="0"/>
+            <a:endParaRPr kumimoji="1" lang="en-US" altLang="ja-JP" sz="2400" dirty="0"/>
+          </a:p>
+          <a:p>
+            <a:r>
+              <a:rPr kumimoji="1" lang="ja-JP" altLang="en-US" sz="2400" dirty="0"/>
               <a:t>解決を試みる</a:t>
             </a:r>
-            <a:endParaRPr kumimoji="1" lang="ja-JP" altLang="en-US" sz="2400" dirty="0"/>
           </a:p>
         </p:txBody>
       </p:sp>
@@ -9270,11 +9099,7 @@
           <a:p>
             <a:r>
               <a:rPr lang="ja-JP" altLang="en-US" sz="2000" dirty="0"/>
-              <a:t>読め</a:t>
-            </a:r>
-            <a:r>
-              <a:rPr lang="ja-JP" altLang="en-US" sz="2000" dirty="0" smtClean="0"/>
-              <a:t>と言われた論文</a:t>
+              <a:t>読めと言われた論文</a:t>
             </a:r>
             <a:endParaRPr kumimoji="1" lang="ja-JP" altLang="en-US" sz="2000" dirty="0"/>
           </a:p>
@@ -9340,16 +9165,8 @@
           <a:lstStyle/>
           <a:p>
             <a:r>
-              <a:rPr lang="ja-JP" altLang="en-US" sz="4000" dirty="0" smtClean="0"/>
-              <a:t>研究に</a:t>
-            </a:r>
-            <a:r>
               <a:rPr lang="ja-JP" altLang="en-US" sz="4000" dirty="0"/>
-              <a:t>は</a:t>
-            </a:r>
-            <a:r>
-              <a:rPr lang="ja-JP" altLang="en-US" sz="4000" dirty="0" smtClean="0"/>
-              <a:t>様々なアプローチがある</a:t>
+              <a:t>研究には様々なアプローチがある</a:t>
             </a:r>
             <a:endParaRPr kumimoji="1" lang="ja-JP" altLang="en-US" sz="4000" dirty="0"/>
           </a:p>
@@ -9401,10 +9218,9 @@
           <a:lstStyle/>
           <a:p>
             <a:r>
-              <a:rPr kumimoji="1" lang="ja-JP" altLang="en-US" dirty="0" smtClean="0"/>
+              <a:rPr kumimoji="1" lang="ja-JP" altLang="en-US" dirty="0"/>
               <a:t>研究の流れ</a:t>
             </a:r>
-            <a:endParaRPr kumimoji="1" lang="ja-JP" altLang="en-US" dirty="0"/>
           </a:p>
         </p:txBody>
       </p:sp>
@@ -9527,10 +9343,9 @@
           <a:lstStyle/>
           <a:p>
             <a:r>
-              <a:rPr kumimoji="1" lang="ja-JP" altLang="en-US" sz="2800" dirty="0" smtClean="0"/>
+              <a:rPr kumimoji="1" lang="ja-JP" altLang="en-US" sz="2800" dirty="0"/>
               <a:t>何か「はじまり」となる研究があり</a:t>
             </a:r>
-            <a:endParaRPr kumimoji="1" lang="ja-JP" altLang="en-US" sz="2800" dirty="0"/>
           </a:p>
         </p:txBody>
       </p:sp>
@@ -9647,11 +9462,7 @@
           <a:p>
             <a:r>
               <a:rPr lang="ja-JP" altLang="en-US" sz="2800" dirty="0"/>
-              <a:t>様々</a:t>
-            </a:r>
-            <a:r>
-              <a:rPr lang="ja-JP" altLang="en-US" sz="2800" dirty="0" smtClean="0"/>
-              <a:t>なアプローチがなされるが</a:t>
+              <a:t>様々なアプローチがなされるが</a:t>
             </a:r>
             <a:endParaRPr kumimoji="1" lang="ja-JP" altLang="en-US" sz="2800" dirty="0"/>
           </a:p>
@@ -9922,18 +9733,17 @@
           <a:lstStyle/>
           <a:p>
             <a:r>
-              <a:rPr kumimoji="1" lang="ja-JP" altLang="en-US" sz="2800" dirty="0" smtClean="0"/>
+              <a:rPr kumimoji="1" lang="ja-JP" altLang="en-US" sz="2800" dirty="0"/>
               <a:t>その中で</a:t>
             </a:r>
             <a:r>
-              <a:rPr kumimoji="1" lang="en-US" altLang="ja-JP" sz="2800" dirty="0" smtClean="0"/>
+              <a:rPr kumimoji="1" lang="en-US" altLang="ja-JP" sz="2800" dirty="0"/>
               <a:t>B</a:t>
             </a:r>
             <a:r>
-              <a:rPr kumimoji="1" lang="ja-JP" altLang="en-US" sz="2800" dirty="0" smtClean="0"/>
+              <a:rPr kumimoji="1" lang="ja-JP" altLang="en-US" sz="2800" dirty="0"/>
               <a:t>というアプローチがあり</a:t>
             </a:r>
-            <a:endParaRPr kumimoji="1" lang="ja-JP" altLang="en-US" sz="2800" dirty="0"/>
           </a:p>
         </p:txBody>
       </p:sp>
@@ -10048,23 +9858,23 @@
           <a:lstStyle/>
           <a:p>
             <a:r>
-              <a:rPr lang="ja-JP" altLang="en-US" sz="2800" dirty="0" smtClean="0"/>
+              <a:rPr lang="ja-JP" altLang="en-US" sz="2800" dirty="0"/>
               <a:t>アプローチ</a:t>
             </a:r>
             <a:r>
-              <a:rPr lang="en-US" altLang="ja-JP" sz="2800" dirty="0" smtClean="0"/>
+              <a:rPr lang="en-US" altLang="ja-JP" sz="2800" dirty="0"/>
               <a:t>B</a:t>
             </a:r>
             <a:r>
-              <a:rPr lang="ja-JP" altLang="en-US" sz="2800" dirty="0" smtClean="0"/>
+              <a:rPr lang="ja-JP" altLang="en-US" sz="2800" dirty="0"/>
               <a:t>の中で</a:t>
             </a:r>
             <a:r>
-              <a:rPr lang="en-US" altLang="ja-JP" sz="2800" dirty="0" smtClean="0"/>
+              <a:rPr lang="en-US" altLang="ja-JP" sz="2800" dirty="0"/>
               <a:t>B’</a:t>
             </a:r>
             <a:r>
-              <a:rPr lang="ja-JP" altLang="en-US" sz="2800" dirty="0" smtClean="0"/>
+              <a:rPr lang="ja-JP" altLang="en-US" sz="2800" dirty="0"/>
               <a:t>という提案をした</a:t>
             </a:r>
             <a:endParaRPr kumimoji="1" lang="ja-JP" altLang="en-US" sz="2800" dirty="0"/>
@@ -10095,11 +9905,7 @@
           <a:p>
             <a:r>
               <a:rPr lang="ja-JP" altLang="en-US" sz="2000" dirty="0"/>
-              <a:t>読め</a:t>
-            </a:r>
-            <a:r>
-              <a:rPr lang="ja-JP" altLang="en-US" sz="2000" dirty="0" smtClean="0"/>
-              <a:t>と言われた論文</a:t>
+              <a:t>読めと言われた論文</a:t>
             </a:r>
             <a:endParaRPr kumimoji="1" lang="ja-JP" altLang="en-US" sz="2000" dirty="0"/>
           </a:p>
@@ -10234,10 +10040,9 @@
           <a:lstStyle/>
           <a:p>
             <a:r>
-              <a:rPr kumimoji="1" lang="ja-JP" altLang="en-US" dirty="0" smtClean="0"/>
+              <a:rPr kumimoji="1" lang="ja-JP" altLang="en-US" dirty="0"/>
               <a:t>研究の流れ</a:t>
             </a:r>
-            <a:endParaRPr kumimoji="1" lang="ja-JP" altLang="en-US" dirty="0"/>
           </a:p>
         </p:txBody>
       </p:sp>
@@ -10780,11 +10585,7 @@
           <a:p>
             <a:r>
               <a:rPr lang="ja-JP" altLang="en-US" sz="2000" dirty="0"/>
-              <a:t>読め</a:t>
-            </a:r>
-            <a:r>
-              <a:rPr lang="ja-JP" altLang="en-US" sz="2000" dirty="0" smtClean="0"/>
-              <a:t>と言われた論文</a:t>
+              <a:t>読めと言われた論文</a:t>
             </a:r>
             <a:endParaRPr kumimoji="1" lang="ja-JP" altLang="en-US" sz="2000" dirty="0"/>
           </a:p>
@@ -10843,10 +10644,9 @@
           <a:lstStyle/>
           <a:p>
             <a:r>
-              <a:rPr kumimoji="1" lang="ja-JP" altLang="en-US" sz="2000" dirty="0" smtClean="0"/>
+              <a:rPr kumimoji="1" lang="ja-JP" altLang="en-US" sz="2000" dirty="0"/>
               <a:t>他のアプローチ</a:t>
             </a:r>
-            <a:endParaRPr kumimoji="1" lang="ja-JP" altLang="en-US" sz="2000" dirty="0"/>
           </a:p>
         </p:txBody>
       </p:sp>
@@ -10873,19 +10673,19 @@
           <a:lstStyle/>
           <a:p>
             <a:r>
-              <a:rPr lang="ja-JP" altLang="en-US" sz="2000" dirty="0" smtClean="0"/>
+              <a:rPr lang="ja-JP" altLang="en-US" sz="2000" dirty="0"/>
               <a:t>直接の親</a:t>
             </a:r>
             <a:r>
-              <a:rPr lang="en-US" altLang="ja-JP" sz="2000" dirty="0" smtClean="0"/>
+              <a:rPr lang="en-US" altLang="ja-JP" sz="2000" dirty="0"/>
               <a:t>(</a:t>
             </a:r>
             <a:r>
-              <a:rPr lang="ja-JP" altLang="en-US" sz="2000" dirty="0" smtClean="0"/>
+              <a:rPr lang="ja-JP" altLang="en-US" sz="2000" dirty="0"/>
               <a:t>一般的には複数</a:t>
             </a:r>
             <a:r>
-              <a:rPr lang="en-US" altLang="ja-JP" sz="2000" dirty="0" smtClean="0"/>
+              <a:rPr lang="en-US" altLang="ja-JP" sz="2000" dirty="0"/>
               <a:t>)</a:t>
             </a:r>
             <a:endParaRPr kumimoji="1" lang="ja-JP" altLang="en-US" sz="2000" dirty="0"/>
@@ -10925,10 +10725,9 @@
           <a:p>
             <a:pPr algn="ctr"/>
             <a:r>
-              <a:rPr kumimoji="1" lang="ja-JP" altLang="en-US" sz="2400" dirty="0" smtClean="0"/>
+              <a:rPr kumimoji="1" lang="ja-JP" altLang="en-US" sz="2400" dirty="0"/>
               <a:t>把握すべきこと</a:t>
             </a:r>
-            <a:endParaRPr kumimoji="1" lang="ja-JP" altLang="en-US" sz="2400" dirty="0"/>
           </a:p>
         </p:txBody>
       </p:sp>
@@ -10959,7 +10758,7 @@
               <a:buChar char="•"/>
             </a:pPr>
             <a:r>
-              <a:rPr kumimoji="1" lang="ja-JP" altLang="en-US" sz="2000" dirty="0" smtClean="0">
+              <a:rPr kumimoji="1" lang="ja-JP" altLang="en-US" sz="2000" dirty="0">
                 <a:solidFill>
                   <a:srgbClr val="FF0000"/>
                 </a:solidFill>
@@ -10967,7 +10766,7 @@
               <a:t>起点となる研究</a:t>
             </a:r>
             <a:r>
-              <a:rPr kumimoji="1" lang="en-US" altLang="ja-JP" sz="2000" dirty="0" smtClean="0">
+              <a:rPr kumimoji="1" lang="en-US" altLang="ja-JP" sz="2000" dirty="0">
                 <a:solidFill>
                   <a:srgbClr val="FF0000"/>
                 </a:solidFill>
@@ -10975,7 +10774,7 @@
               <a:t>(</a:t>
             </a:r>
             <a:r>
-              <a:rPr kumimoji="1" lang="ja-JP" altLang="en-US" sz="2000" dirty="0" smtClean="0">
+              <a:rPr kumimoji="1" lang="ja-JP" altLang="en-US" sz="2000" dirty="0">
                 <a:solidFill>
                   <a:srgbClr val="FF0000"/>
                 </a:solidFill>
@@ -10983,7 +10782,7 @@
               <a:t>祖先</a:t>
             </a:r>
             <a:r>
-              <a:rPr kumimoji="1" lang="en-US" altLang="ja-JP" sz="2000" dirty="0" smtClean="0">
+              <a:rPr kumimoji="1" lang="en-US" altLang="ja-JP" sz="2000" dirty="0">
                 <a:solidFill>
                   <a:srgbClr val="FF0000"/>
                 </a:solidFill>
@@ -10991,14 +10790,14 @@
               <a:t>)</a:t>
             </a:r>
             <a:r>
-              <a:rPr kumimoji="1" lang="ja-JP" altLang="en-US" sz="2000" dirty="0" smtClean="0">
+              <a:rPr kumimoji="1" lang="ja-JP" altLang="en-US" sz="2000" dirty="0">
                 <a:solidFill>
                   <a:srgbClr val="FF0000"/>
                 </a:solidFill>
               </a:rPr>
               <a:t>はどれか</a:t>
             </a:r>
-            <a:endParaRPr kumimoji="1" lang="en-US" altLang="ja-JP" sz="2000" dirty="0" smtClean="0">
+            <a:endParaRPr kumimoji="1" lang="en-US" altLang="ja-JP" sz="2000" dirty="0">
               <a:solidFill>
                 <a:srgbClr val="FF0000"/>
               </a:solidFill>
@@ -11010,7 +10809,7 @@
               <a:buChar char="•"/>
             </a:pPr>
             <a:r>
-              <a:rPr kumimoji="1" lang="ja-JP" altLang="en-US" sz="2000" dirty="0" smtClean="0">
+              <a:rPr kumimoji="1" lang="ja-JP" altLang="en-US" sz="2000" dirty="0">
                 <a:solidFill>
                   <a:srgbClr val="00B050"/>
                 </a:solidFill>
@@ -11026,14 +10825,14 @@
               <a:t>あ</a:t>
             </a:r>
             <a:r>
-              <a:rPr kumimoji="1" lang="ja-JP" altLang="en-US" sz="2000" dirty="0" smtClean="0">
+              <a:rPr kumimoji="1" lang="ja-JP" altLang="en-US" sz="2000" dirty="0">
                 <a:solidFill>
                   <a:srgbClr val="00B050"/>
                 </a:solidFill>
               </a:rPr>
               <a:t>るか</a:t>
             </a:r>
-            <a:endParaRPr kumimoji="1" lang="en-US" altLang="ja-JP" sz="2000" dirty="0" smtClean="0">
+            <a:endParaRPr kumimoji="1" lang="en-US" altLang="ja-JP" sz="2000" dirty="0">
               <a:solidFill>
                 <a:srgbClr val="00B050"/>
               </a:solidFill>
@@ -11045,18 +10844,13 @@
               <a:buChar char="•"/>
             </a:pPr>
             <a:r>
-              <a:rPr kumimoji="1" lang="ja-JP" altLang="en-US" sz="2000" dirty="0" smtClean="0">
+              <a:rPr kumimoji="1" lang="ja-JP" altLang="en-US" sz="2000" dirty="0">
                 <a:solidFill>
                   <a:srgbClr val="011893"/>
                 </a:solidFill>
               </a:rPr>
               <a:t>直接の「親」となる論文はどれか</a:t>
             </a:r>
-            <a:endParaRPr kumimoji="1" lang="ja-JP" altLang="en-US" sz="2000" dirty="0">
-              <a:solidFill>
-                <a:srgbClr val="011893"/>
-              </a:solidFill>
-            </a:endParaRPr>
           </a:p>
         </p:txBody>
       </p:sp>
@@ -11083,11 +10877,11 @@
           <a:lstStyle/>
           <a:p>
             <a:r>
-              <a:rPr kumimoji="1" lang="ja-JP" altLang="en-US" sz="2800" dirty="0" smtClean="0"/>
+              <a:rPr kumimoji="1" lang="ja-JP" altLang="en-US" sz="2800" dirty="0"/>
               <a:t>最終的に↑こんなイメージを</a:t>
             </a:r>
             <a:r>
-              <a:rPr lang="ja-JP" altLang="en-US" sz="2800" dirty="0" smtClean="0"/>
+              <a:rPr lang="ja-JP" altLang="en-US" sz="2800" dirty="0"/>
               <a:t>つかみたい</a:t>
             </a:r>
             <a:endParaRPr kumimoji="1" lang="ja-JP" altLang="en-US" sz="2800" dirty="0"/>
@@ -11271,10 +11065,9 @@
           <a:lstStyle/>
           <a:p>
             <a:r>
-              <a:rPr kumimoji="1" lang="ja-JP" altLang="en-US" dirty="0" smtClean="0"/>
+              <a:rPr kumimoji="1" lang="ja-JP" altLang="en-US" dirty="0"/>
               <a:t>論文の構造</a:t>
             </a:r>
-            <a:endParaRPr kumimoji="1" lang="ja-JP" altLang="en-US" dirty="0"/>
           </a:p>
         </p:txBody>
       </p:sp>
@@ -11451,10 +11244,9 @@
           <a:lstStyle/>
           <a:p>
             <a:r>
-              <a:rPr kumimoji="1" lang="ja-JP" altLang="en-US" sz="2400" dirty="0" smtClean="0"/>
+              <a:rPr kumimoji="1" lang="ja-JP" altLang="en-US" sz="2400" dirty="0"/>
               <a:t>タイトル</a:t>
             </a:r>
-            <a:endParaRPr kumimoji="1" lang="ja-JP" altLang="en-US" sz="2400" dirty="0"/>
           </a:p>
         </p:txBody>
       </p:sp>
@@ -11481,11 +11273,11 @@
           <a:lstStyle/>
           <a:p>
             <a:r>
-              <a:rPr lang="ja-JP" altLang="en-US" sz="2400" dirty="0" smtClean="0"/>
+              <a:rPr lang="ja-JP" altLang="en-US" sz="2400" dirty="0"/>
               <a:t>概要 </a:t>
             </a:r>
             <a:r>
-              <a:rPr lang="en-US" altLang="ja-JP" sz="2400" dirty="0" smtClean="0"/>
+              <a:rPr lang="en-US" altLang="ja-JP" sz="2400" dirty="0"/>
               <a:t>(abstract)</a:t>
             </a:r>
             <a:endParaRPr kumimoji="1" lang="ja-JP" altLang="en-US" sz="2400" dirty="0"/>
@@ -11515,10 +11307,9 @@
           <a:lstStyle/>
           <a:p>
             <a:r>
-              <a:rPr kumimoji="1" lang="ja-JP" altLang="en-US" sz="3600" dirty="0" smtClean="0"/>
+              <a:rPr kumimoji="1" lang="ja-JP" altLang="en-US" sz="3600" dirty="0"/>
               <a:t>本文</a:t>
             </a:r>
-            <a:endParaRPr kumimoji="1" lang="ja-JP" altLang="en-US" sz="3600" dirty="0"/>
           </a:p>
         </p:txBody>
       </p:sp>
@@ -11593,10 +11384,9 @@
           <a:lstStyle/>
           <a:p>
             <a:r>
-              <a:rPr kumimoji="1" lang="ja-JP" altLang="en-US" sz="2400" dirty="0" smtClean="0"/>
+              <a:rPr kumimoji="1" lang="ja-JP" altLang="en-US" sz="2400" dirty="0"/>
               <a:t>手法</a:t>
             </a:r>
-            <a:endParaRPr kumimoji="1" lang="ja-JP" altLang="en-US" sz="2400" dirty="0"/>
           </a:p>
         </p:txBody>
       </p:sp>
@@ -11979,12 +11769,8 @@
           <a:lstStyle/>
           <a:p>
             <a:r>
-              <a:rPr lang="ja-JP" altLang="en-US" sz="2400" dirty="0" smtClean="0"/>
-              <a:t>参考</a:t>
-            </a:r>
-            <a:r>
               <a:rPr lang="ja-JP" altLang="en-US" sz="2400" dirty="0"/>
-              <a:t>文献</a:t>
+              <a:t>参考文献</a:t>
             </a:r>
             <a:endParaRPr kumimoji="1" lang="ja-JP" altLang="en-US" sz="2400" dirty="0"/>
           </a:p>
@@ -12013,18 +11799,17 @@
           <a:lstStyle/>
           <a:p>
             <a:r>
-              <a:rPr kumimoji="1" lang="en-US" altLang="ja-JP" dirty="0" smtClean="0"/>
+              <a:rPr kumimoji="1" lang="en-US" altLang="ja-JP" dirty="0"/>
               <a:t>※</a:t>
             </a:r>
             <a:r>
-              <a:rPr lang="ja-JP" altLang="en-US" dirty="0" smtClean="0"/>
+              <a:rPr lang="ja-JP" altLang="en-US" dirty="0"/>
               <a:t>流儀</a:t>
             </a:r>
             <a:r>
-              <a:rPr kumimoji="1" lang="ja-JP" altLang="en-US" dirty="0" smtClean="0"/>
+              <a:rPr kumimoji="1" lang="ja-JP" altLang="en-US" dirty="0"/>
               <a:t>はいろいろあるので、あくまで一例です</a:t>
             </a:r>
-            <a:endParaRPr kumimoji="1" lang="ja-JP" altLang="en-US" dirty="0"/>
           </a:p>
         </p:txBody>
       </p:sp>
@@ -12092,18 +11877,13 @@
           <a:lstStyle/>
           <a:p>
             <a:r>
-              <a:rPr kumimoji="1" lang="ja-JP" altLang="en-US" sz="2000" dirty="0" smtClean="0">
+              <a:rPr kumimoji="1" lang="ja-JP" altLang="en-US" sz="2000" dirty="0">
                 <a:solidFill>
                   <a:srgbClr val="FF0000"/>
                 </a:solidFill>
               </a:rPr>
               <a:t>まずここを読む</a:t>
             </a:r>
-            <a:endParaRPr kumimoji="1" lang="ja-JP" altLang="en-US" sz="2000" dirty="0">
-              <a:solidFill>
-                <a:srgbClr val="FF0000"/>
-              </a:solidFill>
-            </a:endParaRPr>
           </a:p>
         </p:txBody>
       </p:sp>
@@ -12181,11 +11961,11 @@
           <a:lstStyle/>
           <a:p>
             <a:r>
-              <a:rPr lang="ja-JP" altLang="en-US" sz="2000" dirty="0" smtClean="0"/>
+              <a:rPr lang="ja-JP" altLang="en-US" sz="2000" dirty="0"/>
               <a:t>導入</a:t>
             </a:r>
             <a:r>
-              <a:rPr lang="en-US" altLang="ja-JP" sz="2000" dirty="0" smtClean="0"/>
+              <a:rPr lang="en-US" altLang="ja-JP" sz="2000" dirty="0"/>
               <a:t>(introduction)</a:t>
             </a:r>
             <a:endParaRPr kumimoji="1" lang="ja-JP" altLang="en-US" sz="2000" dirty="0"/>
@@ -12238,10 +12018,9 @@
           <a:lstStyle/>
           <a:p>
             <a:r>
-              <a:rPr kumimoji="1" lang="ja-JP" altLang="en-US" dirty="0" smtClean="0"/>
+              <a:rPr kumimoji="1" lang="ja-JP" altLang="en-US" dirty="0"/>
               <a:t>イントロダクションの構造</a:t>
             </a:r>
-            <a:endParaRPr kumimoji="1" lang="ja-JP" altLang="en-US" dirty="0"/>
           </a:p>
         </p:txBody>
       </p:sp>
@@ -12326,7 +12105,7 @@
           <a:lstStyle/>
           <a:p>
             <a:r>
-              <a:rPr lang="ja-JP" altLang="en-US" sz="4000" dirty="0" smtClean="0"/>
+              <a:rPr lang="ja-JP" altLang="en-US" sz="4000" dirty="0"/>
               <a:t>広く抽象的な話から</a:t>
             </a:r>
             <a:endParaRPr kumimoji="1" lang="ja-JP" altLang="en-US" sz="4000" dirty="0"/>
@@ -12402,10 +12181,9 @@
           <a:lstStyle/>
           <a:p>
             <a:r>
-              <a:rPr kumimoji="1" lang="ja-JP" altLang="en-US" sz="4000" dirty="0" smtClean="0"/>
+              <a:rPr kumimoji="1" lang="ja-JP" altLang="en-US" sz="4000" dirty="0"/>
               <a:t>狭く具体的な話へ</a:t>
             </a:r>
-            <a:endParaRPr kumimoji="1" lang="ja-JP" altLang="en-US" sz="4000" dirty="0"/>
           </a:p>
         </p:txBody>
       </p:sp>
@@ -12463,80 +12241,16 @@
         <a:srgbClr val="738F97"/>
       </a:folHlink>
     </a:clrScheme>
-    <a:fontScheme name="パーセル">
+    <a:fontScheme name="講義用">
       <a:majorFont>
-        <a:latin typeface="Gill Sans MT" panose="020B0502020104020203"/>
-        <a:ea typeface=""/>
+        <a:latin typeface="Arial"/>
+        <a:ea typeface="HGｺﾞｼｯｸE"/>
         <a:cs typeface=""/>
-        <a:font script="Grek" typeface="Corbel"/>
-        <a:font script="Cyrl" typeface="Corbel"/>
-        <a:font script="Jpan" typeface="HGｺﾞｼｯｸE"/>
-        <a:font script="Hang" typeface="휴먼매직체"/>
-        <a:font script="Hans" typeface="华文中宋"/>
-        <a:font script="Hant" typeface="微軟正黑體"/>
-        <a:font script="Arab" typeface="Majalla UI"/>
-        <a:font script="Hebr" typeface="Arial"/>
-        <a:font script="Thai" typeface="Cordia New"/>
-        <a:font script="Ethi" typeface="Nyala"/>
-        <a:font script="Beng" typeface="Vrinda"/>
-        <a:font script="Gujr" typeface="Shruti"/>
-        <a:font script="Khmr" typeface="DaunPenh"/>
-        <a:font script="Knda" typeface="Tunga"/>
-        <a:font script="Guru" typeface="Raavi"/>
-        <a:font script="Cans" typeface="Euphemia"/>
-        <a:font script="Cher" typeface="Plantagenet Cherokee"/>
-        <a:font script="Yiii" typeface="Microsoft Yi Baiti"/>
-        <a:font script="Tibt" typeface="Microsoft Himalaya"/>
-        <a:font script="Thaa" typeface="MV Boli"/>
-        <a:font script="Deva" typeface="Mangal"/>
-        <a:font script="Telu" typeface="Gautami"/>
-        <a:font script="Taml" typeface="Latha"/>
-        <a:font script="Syrc" typeface="Estrangelo Edessa"/>
-        <a:font script="Orya" typeface="Kalinga"/>
-        <a:font script="Mlym" typeface="Kartika"/>
-        <a:font script="Laoo" typeface="DokChampa"/>
-        <a:font script="Sinh" typeface="Iskoola Pota"/>
-        <a:font script="Mong" typeface="Mongolian Baiti"/>
-        <a:font script="Viet" typeface="Tahoma"/>
-        <a:font script="Uigh" typeface="Microsoft Uighur"/>
-        <a:font script="Geor" typeface="Sylfaen"/>
       </a:majorFont>
       <a:minorFont>
-        <a:latin typeface="Gill Sans MT" panose="020B0502020104020203"/>
-        <a:ea typeface=""/>
+        <a:latin typeface="Arial"/>
+        <a:ea typeface="HGｺﾞｼｯｸE"/>
         <a:cs typeface=""/>
-        <a:font script="Grek" typeface="Corbel"/>
-        <a:font script="Cyrl" typeface="Corbel"/>
-        <a:font script="Jpan" typeface="HGｺﾞｼｯｸE"/>
-        <a:font script="Hang" typeface="휴먼매직체"/>
-        <a:font script="Hans" typeface="华文中宋"/>
-        <a:font script="Hant" typeface="微軟正黑體"/>
-        <a:font script="Arab" typeface="Majalla UI"/>
-        <a:font script="Hebr" typeface="Arial"/>
-        <a:font script="Thai" typeface="Cordia New"/>
-        <a:font script="Ethi" typeface="Nyala"/>
-        <a:font script="Beng" typeface="Vrinda"/>
-        <a:font script="Gujr" typeface="Shruti"/>
-        <a:font script="Khmr" typeface="DaunPenh"/>
-        <a:font script="Knda" typeface="Tunga"/>
-        <a:font script="Guru" typeface="Raavi"/>
-        <a:font script="Cans" typeface="Euphemia"/>
-        <a:font script="Cher" typeface="Plantagenet Cherokee"/>
-        <a:font script="Yiii" typeface="Microsoft Yi Baiti"/>
-        <a:font script="Tibt" typeface="Microsoft Himalaya"/>
-        <a:font script="Thaa" typeface="MV Boli"/>
-        <a:font script="Deva" typeface="Mangal"/>
-        <a:font script="Telu" typeface="Gautami"/>
-        <a:font script="Taml" typeface="Latha"/>
-        <a:font script="Syrc" typeface="Estrangelo Edessa"/>
-        <a:font script="Orya" typeface="Kalinga"/>
-        <a:font script="Mlym" typeface="Kartika"/>
-        <a:font script="Laoo" typeface="DokChampa"/>
-        <a:font script="Sinh" typeface="Iskoola Pota"/>
-        <a:font script="Mong" typeface="Mongolian Baiti"/>
-        <a:font script="Viet" typeface="Tahoma"/>
-        <a:font script="Uigh" typeface="Microsoft Uighur"/>
-        <a:font script="Geor" typeface="Sylfaen"/>
       </a:minorFont>
     </a:fontScheme>
     <a:fmtScheme name="パーセル">

</xml_diff>